<commit_message>
Renamed to WebNFC Bridge
</commit_message>
<xml_diff>
--- a/resources/docs/webnfc--web2device-bridge.pptx
+++ b/resources/docs/webnfc--web2device-bridge.pptx
@@ -5,12 +5,13 @@
     <p:sldMasterId id="2147483648" r:id="rId1"/>
   </p:sldMasterIdLst>
   <p:handoutMasterIdLst>
-    <p:handoutMasterId r:id="rId5"/>
+    <p:handoutMasterId r:id="rId6"/>
   </p:handoutMasterIdLst>
   <p:sldIdLst>
     <p:sldId id="261" r:id="rId2"/>
     <p:sldId id="262" r:id="rId3"/>
     <p:sldId id="259" r:id="rId4"/>
+    <p:sldId id="263" r:id="rId5"/>
   </p:sldIdLst>
   <p:sldSz cx="9144000" cy="6858000" type="screen4x3"/>
   <p:notesSz cx="6858000" cy="9144000"/>
@@ -194,7 +195,7 @@
           <a:p>
             <a:fld id="{07A00844-99C3-4B4D-8665-83D6466F1606}" type="datetimeFigureOut">
               <a:rPr lang="en-US" smtClean="0"/>
-              <a:t>2015-04-12</a:t>
+              <a:t>2015-04-14</a:t>
             </a:fld>
             <a:endParaRPr lang="en-US"/>
           </a:p>
@@ -472,7 +473,7 @@
           <a:p>
             <a:fld id="{A1FD92F6-7B59-47F7-9C80-4F94E0E83D60}" type="datetimeFigureOut">
               <a:rPr lang="en-US" smtClean="0"/>
-              <a:t>2015-04-12</a:t>
+              <a:t>2015-04-14</a:t>
             </a:fld>
             <a:endParaRPr lang="en-US"/>
           </a:p>
@@ -689,7 +690,7 @@
           <a:p>
             <a:fld id="{A1FD92F6-7B59-47F7-9C80-4F94E0E83D60}" type="datetimeFigureOut">
               <a:rPr lang="en-US" smtClean="0"/>
-              <a:t>2015-04-12</a:t>
+              <a:t>2015-04-14</a:t>
             </a:fld>
             <a:endParaRPr lang="en-US"/>
           </a:p>
@@ -899,7 +900,7 @@
           <a:p>
             <a:fld id="{A1FD92F6-7B59-47F7-9C80-4F94E0E83D60}" type="datetimeFigureOut">
               <a:rPr lang="en-US" smtClean="0"/>
-              <a:t>2015-04-12</a:t>
+              <a:t>2015-04-14</a:t>
             </a:fld>
             <a:endParaRPr lang="en-US"/>
           </a:p>
@@ -1184,7 +1185,7 @@
           <a:p>
             <a:fld id="{A1FD92F6-7B59-47F7-9C80-4F94E0E83D60}" type="datetimeFigureOut">
               <a:rPr lang="en-US" smtClean="0"/>
-              <a:t>2015-04-12</a:t>
+              <a:t>2015-04-14</a:t>
             </a:fld>
             <a:endParaRPr lang="en-US"/>
           </a:p>
@@ -1467,7 +1468,7 @@
           <a:p>
             <a:fld id="{A1FD92F6-7B59-47F7-9C80-4F94E0E83D60}" type="datetimeFigureOut">
               <a:rPr lang="en-US" smtClean="0"/>
-              <a:t>2015-04-12</a:t>
+              <a:t>2015-04-14</a:t>
             </a:fld>
             <a:endParaRPr lang="en-US"/>
           </a:p>
@@ -1800,7 +1801,7 @@
           <a:p>
             <a:fld id="{A1FD92F6-7B59-47F7-9C80-4F94E0E83D60}" type="datetimeFigureOut">
               <a:rPr lang="en-US" smtClean="0"/>
-              <a:t>2015-04-12</a:t>
+              <a:t>2015-04-14</a:t>
             </a:fld>
             <a:endParaRPr lang="en-US"/>
           </a:p>
@@ -2266,7 +2267,7 @@
           <a:p>
             <a:fld id="{A1FD92F6-7B59-47F7-9C80-4F94E0E83D60}" type="datetimeFigureOut">
               <a:rPr lang="en-US" smtClean="0"/>
-              <a:t>2015-04-12</a:t>
+              <a:t>2015-04-14</a:t>
             </a:fld>
             <a:endParaRPr lang="en-US"/>
           </a:p>
@@ -2416,7 +2417,7 @@
           <a:p>
             <a:fld id="{A1FD92F6-7B59-47F7-9C80-4F94E0E83D60}" type="datetimeFigureOut">
               <a:rPr lang="en-US" smtClean="0"/>
-              <a:t>2015-04-12</a:t>
+              <a:t>2015-04-14</a:t>
             </a:fld>
             <a:endParaRPr lang="en-US"/>
           </a:p>
@@ -2535,7 +2536,7 @@
           <a:p>
             <a:fld id="{A1FD92F6-7B59-47F7-9C80-4F94E0E83D60}" type="datetimeFigureOut">
               <a:rPr lang="en-US" smtClean="0"/>
-              <a:t>2015-04-12</a:t>
+              <a:t>2015-04-14</a:t>
             </a:fld>
             <a:endParaRPr lang="en-US"/>
           </a:p>
@@ -2845,7 +2846,7 @@
           <a:p>
             <a:fld id="{A1FD92F6-7B59-47F7-9C80-4F94E0E83D60}" type="datetimeFigureOut">
               <a:rPr lang="en-US" smtClean="0"/>
-              <a:t>2015-04-12</a:t>
+              <a:t>2015-04-14</a:t>
             </a:fld>
             <a:endParaRPr lang="en-US"/>
           </a:p>
@@ -3131,7 +3132,7 @@
           <a:p>
             <a:fld id="{A1FD92F6-7B59-47F7-9C80-4F94E0E83D60}" type="datetimeFigureOut">
               <a:rPr lang="en-US" smtClean="0"/>
-              <a:t>2015-04-12</a:t>
+              <a:t>2015-04-14</a:t>
             </a:fld>
             <a:endParaRPr lang="en-US"/>
           </a:p>
@@ -3239,7 +3240,7 @@
         <p:spPr>
           <a:xfrm>
             <a:off x="-12355" y="6673334"/>
-            <a:ext cx="1888659" cy="184666"/>
+            <a:ext cx="1931939" cy="184666"/>
           </a:xfrm>
           <a:prstGeom prst="rect">
             <a:avLst/>
@@ -3285,7 +3286,7 @@
                 <a:latin typeface="Arial" panose="020B0604020202020204" pitchFamily="34" charset="0"/>
                 <a:cs typeface="Arial" panose="020B0604020202020204" pitchFamily="34" charset="0"/>
               </a:rPr>
-              <a:t>V0.5, 2015-04-12</a:t>
+              <a:t>V0.51, 2015-04-14</a:t>
             </a:r>
             <a:endParaRPr lang="en-US" sz="600" baseline="0" dirty="0" smtClean="0">
               <a:latin typeface="Arial" panose="020B0604020202020204" pitchFamily="34" charset="0"/>
@@ -3302,8 +3303,8 @@
         </p:nvSpPr>
         <p:spPr>
           <a:xfrm>
-            <a:off x="8579614" y="6669360"/>
-            <a:ext cx="545341" cy="184666"/>
+            <a:off x="8579613" y="6669360"/>
+            <a:ext cx="545342" cy="184666"/>
           </a:xfrm>
           <a:prstGeom prst="rect">
             <a:avLst/>
@@ -3336,7 +3337,7 @@
                 <a:latin typeface="Arial" panose="020B0604020202020204" pitchFamily="34" charset="0"/>
                 <a:cs typeface="Arial" panose="020B0604020202020204" pitchFamily="34" charset="0"/>
               </a:rPr>
-              <a:t>/3</a:t>
+              <a:t>/4</a:t>
             </a:r>
             <a:endParaRPr lang="en-US" sz="600" dirty="0">
               <a:latin typeface="Arial" panose="020B0604020202020204" pitchFamily="34" charset="0"/>
@@ -3354,7 +3355,7 @@
         <p:spPr>
           <a:xfrm>
             <a:off x="3635896" y="6669360"/>
-            <a:ext cx="2315057" cy="184666"/>
+            <a:ext cx="2193229" cy="184666"/>
           </a:xfrm>
           <a:prstGeom prst="rect">
             <a:avLst/>
@@ -3368,32 +3369,25 @@
           <a:lstStyle/>
           <a:p>
             <a:r>
+              <a:rPr lang="en-US" sz="600" dirty="0" err="1" smtClean="0">
+                <a:latin typeface="Arial" panose="020B0604020202020204" pitchFamily="34" charset="0"/>
+                <a:cs typeface="Arial" panose="020B0604020202020204" pitchFamily="34" charset="0"/>
+              </a:rPr>
+              <a:t>WebNFC</a:t>
+            </a:r>
+            <a:r>
               <a:rPr lang="en-US" sz="600" dirty="0" smtClean="0">
                 <a:latin typeface="Arial" panose="020B0604020202020204" pitchFamily="34" charset="0"/>
                 <a:cs typeface="Arial" panose="020B0604020202020204" pitchFamily="34" charset="0"/>
               </a:rPr>
-              <a:t>Web2Device </a:t>
+              <a:t> </a:t>
             </a:r>
             <a:r>
               <a:rPr lang="en-US" sz="600" dirty="0" smtClean="0">
                 <a:latin typeface="Arial" panose="020B0604020202020204" pitchFamily="34" charset="0"/>
                 <a:cs typeface="Arial" panose="020B0604020202020204" pitchFamily="34" charset="0"/>
               </a:rPr>
-              <a:t>Bridge (Public Domain </a:t>
-            </a:r>
-            <a:r>
-              <a:rPr lang="en-US" sz="600" dirty="0" smtClean="0">
-                <a:latin typeface="Arial" panose="020B0604020202020204" pitchFamily="34" charset="0"/>
-                <a:cs typeface="Arial" panose="020B0604020202020204" pitchFamily="34" charset="0"/>
-              </a:rPr>
-              <a:t>Conceptual </a:t>
-            </a:r>
-            <a:r>
-              <a:rPr lang="en-US" sz="600" dirty="0" smtClean="0">
-                <a:latin typeface="Arial" panose="020B0604020202020204" pitchFamily="34" charset="0"/>
-                <a:cs typeface="Arial" panose="020B0604020202020204" pitchFamily="34" charset="0"/>
-              </a:rPr>
-              <a:t>Specification)</a:t>
+              <a:t>Bridge (Public Domain Conceptual Specification)</a:t>
             </a:r>
             <a:endParaRPr lang="en-US" sz="600" dirty="0">
               <a:latin typeface="Arial" panose="020B0604020202020204" pitchFamily="34" charset="0"/>
@@ -3739,8 +3733,8 @@
         </p:nvSpPr>
         <p:spPr>
           <a:xfrm>
-            <a:off x="2069178" y="1844824"/>
-            <a:ext cx="5030031" cy="584775"/>
+            <a:off x="1889642" y="1844824"/>
+            <a:ext cx="5389104" cy="584775"/>
           </a:xfrm>
           <a:prstGeom prst="rect">
             <a:avLst/>
@@ -3793,11 +3787,25 @@
           <a:p>
             <a:pPr algn="ctr"/>
             <a:r>
+              <a:rPr lang="en-US" sz="1600" dirty="0">
+                <a:latin typeface="Arial" panose="020B0604020202020204" pitchFamily="34" charset="0"/>
+                <a:cs typeface="Arial" panose="020B0604020202020204" pitchFamily="34" charset="0"/>
+              </a:rPr>
+              <a:t>a</a:t>
+            </a:r>
+            <a:r>
               <a:rPr lang="en-US" sz="1600" dirty="0" smtClean="0">
                 <a:latin typeface="Arial" panose="020B0604020202020204" pitchFamily="34" charset="0"/>
                 <a:cs typeface="Arial" panose="020B0604020202020204" pitchFamily="34" charset="0"/>
               </a:rPr>
-              <a:t>a Web-page and a Connecting Mobile Device</a:t>
+              <a:t>n Untrusted </a:t>
+            </a:r>
+            <a:r>
+              <a:rPr lang="en-US" sz="1600" dirty="0" smtClean="0">
+                <a:latin typeface="Arial" panose="020B0604020202020204" pitchFamily="34" charset="0"/>
+                <a:cs typeface="Arial" panose="020B0604020202020204" pitchFamily="34" charset="0"/>
+              </a:rPr>
+              <a:t>Web-page and a Connecting Mobile Device</a:t>
             </a:r>
             <a:endParaRPr lang="en-US" sz="1600" dirty="0">
               <a:latin typeface="Arial" panose="020B0604020202020204" pitchFamily="34" charset="0"/>
@@ -3964,14 +3972,7 @@
                 <a:latin typeface="Arial" panose="020B0604020202020204" pitchFamily="34" charset="0"/>
                 <a:cs typeface="Arial" panose="020B0604020202020204" pitchFamily="34" charset="0"/>
               </a:rPr>
-              <a:t> should be </a:t>
-            </a:r>
-            <a:r>
-              <a:rPr lang="en-US" sz="1600" dirty="0" smtClean="0">
-                <a:latin typeface="Arial" panose="020B0604020202020204" pitchFamily="34" charset="0"/>
-                <a:cs typeface="Arial" panose="020B0604020202020204" pitchFamily="34" charset="0"/>
-              </a:rPr>
-              <a:t>identical, including error handling.</a:t>
+              <a:t> should be identical, including error handling.</a:t>
             </a:r>
           </a:p>
           <a:p>
@@ -3987,10 +3988,6 @@
               </a:rPr>
               <a:t>Note that this specification does not include a security element since such functionality can be supplied in many different ways when needed. </a:t>
             </a:r>
-            <a:endParaRPr lang="en-US" sz="1600" dirty="0" smtClean="0">
-              <a:latin typeface="Arial" panose="020B0604020202020204" pitchFamily="34" charset="0"/>
-              <a:cs typeface="Arial" panose="020B0604020202020204" pitchFamily="34" charset="0"/>
-            </a:endParaRPr>
           </a:p>
         </p:txBody>
       </p:sp>
@@ -4053,8 +4050,8 @@
         </p:nvSpPr>
         <p:spPr>
           <a:xfrm>
-            <a:off x="2829120" y="1124744"/>
-            <a:ext cx="3516475" cy="584775"/>
+            <a:off x="3114454" y="1124744"/>
+            <a:ext cx="2945806" cy="584775"/>
           </a:xfrm>
           <a:prstGeom prst="rect">
             <a:avLst/>
@@ -4069,11 +4066,25 @@
           <a:p>
             <a:pPr algn="ctr"/>
             <a:r>
+              <a:rPr lang="en-US" sz="3200" dirty="0" err="1" smtClean="0">
+                <a:latin typeface="Times New Roman" panose="02020603050405020304" pitchFamily="18" charset="0"/>
+                <a:cs typeface="Times New Roman" panose="02020603050405020304" pitchFamily="18" charset="0"/>
+              </a:rPr>
+              <a:t>WebNFC</a:t>
+            </a:r>
+            <a:r>
               <a:rPr lang="en-US" sz="3200" dirty="0" smtClean="0">
                 <a:latin typeface="Times New Roman" panose="02020603050405020304" pitchFamily="18" charset="0"/>
                 <a:cs typeface="Times New Roman" panose="02020603050405020304" pitchFamily="18" charset="0"/>
               </a:rPr>
-              <a:t>Web2Device Bridge</a:t>
+              <a:t> </a:t>
+            </a:r>
+            <a:r>
+              <a:rPr lang="en-US" sz="3200" dirty="0" smtClean="0">
+                <a:latin typeface="Times New Roman" panose="02020603050405020304" pitchFamily="18" charset="0"/>
+                <a:cs typeface="Times New Roman" panose="02020603050405020304" pitchFamily="18" charset="0"/>
+              </a:rPr>
+              <a:t>Bridge</a:t>
             </a:r>
             <a:endParaRPr lang="en-US" sz="3200" dirty="0">
               <a:latin typeface="Times New Roman" panose="02020603050405020304" pitchFamily="18" charset="0"/>
@@ -4237,19 +4248,8 @@
                 <a:latin typeface="Arial" panose="020B0604020202020204" pitchFamily="34" charset="0"/>
                 <a:cs typeface="Arial" panose="020B0604020202020204" pitchFamily="34" charset="0"/>
               </a:rPr>
-              <a:t>User interacts with a Web application on </a:t>
-            </a:r>
-            <a:r>
-              <a:rPr lang="en-US" sz="1000" dirty="0" smtClean="0">
-                <a:latin typeface="Arial" panose="020B0604020202020204" pitchFamily="34" charset="0"/>
-                <a:cs typeface="Arial" panose="020B0604020202020204" pitchFamily="34" charset="0"/>
-              </a:rPr>
-              <a:t>a PC, POS terminal, Vending machine, etc.</a:t>
-            </a:r>
-            <a:endParaRPr lang="en-US" sz="1000" dirty="0" smtClean="0">
-              <a:latin typeface="Arial" panose="020B0604020202020204" pitchFamily="34" charset="0"/>
-              <a:cs typeface="Arial" panose="020B0604020202020204" pitchFamily="34" charset="0"/>
-            </a:endParaRPr>
+              <a:t>User interacts with a Web application on a PC, POS terminal, Vending machine, etc.</a:t>
+            </a:r>
           </a:p>
         </p:txBody>
       </p:sp>
@@ -4261,8 +4261,8 @@
         </p:nvSpPr>
         <p:spPr>
           <a:xfrm>
-            <a:off x="1909560" y="292586"/>
-            <a:ext cx="5127942" cy="461665"/>
+            <a:off x="2121957" y="292586"/>
+            <a:ext cx="4703147" cy="461665"/>
           </a:xfrm>
           <a:prstGeom prst="rect">
             <a:avLst/>
@@ -4277,25 +4277,25 @@
           <a:p>
             <a:pPr algn="ctr"/>
             <a:r>
+              <a:rPr lang="en-US" sz="2400" dirty="0" err="1" smtClean="0">
+                <a:latin typeface="Times New Roman" panose="02020603050405020304" pitchFamily="18" charset="0"/>
+                <a:cs typeface="Times New Roman" panose="02020603050405020304" pitchFamily="18" charset="0"/>
+              </a:rPr>
+              <a:t>WebNFC</a:t>
+            </a:r>
+            <a:r>
               <a:rPr lang="en-US" sz="2400" dirty="0" smtClean="0">
                 <a:latin typeface="Times New Roman" panose="02020603050405020304" pitchFamily="18" charset="0"/>
                 <a:cs typeface="Times New Roman" panose="02020603050405020304" pitchFamily="18" charset="0"/>
               </a:rPr>
-              <a:t>Web2Device </a:t>
+              <a:t> </a:t>
             </a:r>
             <a:r>
               <a:rPr lang="en-US" sz="2400" dirty="0" smtClean="0">
                 <a:latin typeface="Times New Roman" panose="02020603050405020304" pitchFamily="18" charset="0"/>
                 <a:cs typeface="Times New Roman" panose="02020603050405020304" pitchFamily="18" charset="0"/>
               </a:rPr>
-              <a:t>Bridge – </a:t>
-            </a:r>
-            <a:r>
-              <a:rPr lang="en-US" sz="2400" dirty="0" smtClean="0">
-                <a:latin typeface="Times New Roman" panose="02020603050405020304" pitchFamily="18" charset="0"/>
-                <a:cs typeface="Times New Roman" panose="02020603050405020304" pitchFamily="18" charset="0"/>
-              </a:rPr>
-              <a:t>Typical Use Case</a:t>
+              <a:t>Bridge – Typical Use Case</a:t>
             </a:r>
             <a:endParaRPr lang="en-US" sz="2400" dirty="0">
               <a:latin typeface="Arial" panose="020B0604020202020204" pitchFamily="34" charset="0"/>
@@ -6898,15 +6898,7 @@
                   <a:ea typeface="Calibri"/>
                   <a:cs typeface="Times New Roman"/>
                 </a:rPr>
-                <a:t>m</a:t>
-              </a:r>
-              <a:r>
-                <a:rPr lang="en-US" sz="1000" dirty="0" smtClean="0">
-                  <a:latin typeface="Arial"/>
-                  <a:ea typeface="Calibri"/>
-                  <a:cs typeface="Times New Roman"/>
-                </a:rPr>
-                <a:t>erchant.com</a:t>
+                <a:t>merchant.com</a:t>
               </a:r>
               <a:endParaRPr lang="en-US" sz="1000" dirty="0">
                 <a:effectLst/>
@@ -7176,10 +7168,6 @@
               </a:rPr>
               <a:t>User performs the NFC connection</a:t>
             </a:r>
-            <a:endParaRPr lang="en-US" sz="1000" dirty="0" smtClean="0">
-              <a:latin typeface="Arial" panose="020B0604020202020204" pitchFamily="34" charset="0"/>
-              <a:cs typeface="Arial" panose="020B0604020202020204" pitchFamily="34" charset="0"/>
-            </a:endParaRPr>
           </a:p>
         </p:txBody>
       </p:sp>
@@ -7220,14 +7208,7 @@
                 <a:latin typeface="Arial" panose="020B0604020202020204" pitchFamily="34" charset="0"/>
                 <a:cs typeface="Arial" panose="020B0604020202020204" pitchFamily="34" charset="0"/>
               </a:rPr>
-              <a:t>User finishes </a:t>
-            </a:r>
-            <a:r>
-              <a:rPr lang="en-US" sz="1000" dirty="0" smtClean="0">
-                <a:latin typeface="Arial" panose="020B0604020202020204" pitchFamily="34" charset="0"/>
-                <a:cs typeface="Arial" panose="020B0604020202020204" pitchFamily="34" charset="0"/>
-              </a:rPr>
-              <a:t>the request in the</a:t>
+              <a:t>User finishes the request in the</a:t>
             </a:r>
             <a:br>
               <a:rPr lang="en-US" sz="1000" dirty="0" smtClean="0">
@@ -7240,12 +7221,15 @@
                 <a:latin typeface="Arial" panose="020B0604020202020204" pitchFamily="34" charset="0"/>
                 <a:cs typeface="Arial" panose="020B0604020202020204" pitchFamily="34" charset="0"/>
               </a:rPr>
-              <a:t>connected mobile device</a:t>
-            </a:r>
-            <a:endParaRPr lang="en-US" sz="1000" dirty="0" smtClean="0">
-              <a:latin typeface="Arial" panose="020B0604020202020204" pitchFamily="34" charset="0"/>
-              <a:cs typeface="Arial" panose="020B0604020202020204" pitchFamily="34" charset="0"/>
-            </a:endParaRPr>
+              <a:t>securely connected </a:t>
+            </a:r>
+            <a:r>
+              <a:rPr lang="en-US" sz="1000" dirty="0" smtClean="0">
+                <a:latin typeface="Arial" panose="020B0604020202020204" pitchFamily="34" charset="0"/>
+                <a:cs typeface="Arial" panose="020B0604020202020204" pitchFamily="34" charset="0"/>
+              </a:rPr>
+              <a:t>mobile device</a:t>
+            </a:r>
           </a:p>
         </p:txBody>
       </p:sp>
@@ -7294,8 +7278,8 @@
         </p:nvSpPr>
         <p:spPr>
           <a:xfrm>
-            <a:off x="1815078" y="292586"/>
-            <a:ext cx="5316905" cy="461665"/>
+            <a:off x="2027476" y="292586"/>
+            <a:ext cx="4892109" cy="461665"/>
           </a:xfrm>
           <a:prstGeom prst="rect">
             <a:avLst/>
@@ -7310,25 +7294,25 @@
           <a:p>
             <a:pPr algn="ctr"/>
             <a:r>
+              <a:rPr lang="en-US" sz="2400" dirty="0" err="1" smtClean="0">
+                <a:latin typeface="Times New Roman" panose="02020603050405020304" pitchFamily="18" charset="0"/>
+                <a:cs typeface="Times New Roman" panose="02020603050405020304" pitchFamily="18" charset="0"/>
+              </a:rPr>
+              <a:t>WebNFC</a:t>
+            </a:r>
+            <a:r>
               <a:rPr lang="en-US" sz="2400" dirty="0" smtClean="0">
                 <a:latin typeface="Times New Roman" panose="02020603050405020304" pitchFamily="18" charset="0"/>
                 <a:cs typeface="Times New Roman" panose="02020603050405020304" pitchFamily="18" charset="0"/>
               </a:rPr>
-              <a:t>Web2Device </a:t>
+              <a:t> </a:t>
             </a:r>
             <a:r>
               <a:rPr lang="en-US" sz="2400" dirty="0" smtClean="0">
                 <a:latin typeface="Times New Roman" panose="02020603050405020304" pitchFamily="18" charset="0"/>
                 <a:cs typeface="Times New Roman" panose="02020603050405020304" pitchFamily="18" charset="0"/>
               </a:rPr>
-              <a:t>Bridge – </a:t>
-            </a:r>
-            <a:r>
-              <a:rPr lang="en-US" sz="2400" dirty="0" smtClean="0">
-                <a:latin typeface="Times New Roman" panose="02020603050405020304" pitchFamily="18" charset="0"/>
-                <a:cs typeface="Times New Roman" panose="02020603050405020304" pitchFamily="18" charset="0"/>
-              </a:rPr>
-              <a:t>Sequence Diagram</a:t>
+              <a:t>Bridge – Sequence Diagram</a:t>
             </a:r>
             <a:endParaRPr lang="en-US" sz="2400" dirty="0">
               <a:latin typeface="Arial" panose="020B0604020202020204" pitchFamily="34" charset="0"/>
@@ -7381,7 +7365,14 @@
                 <a:latin typeface="Arial" panose="020B0604020202020204" pitchFamily="34" charset="0"/>
                 <a:cs typeface="Arial" panose="020B0604020202020204" pitchFamily="34" charset="0"/>
               </a:rPr>
-              <a:t>Requesting Device</a:t>
+              <a:t>Requesting </a:t>
+            </a:r>
+            <a:r>
+              <a:rPr lang="en-US" sz="1400" dirty="0" smtClean="0">
+                <a:latin typeface="Arial" panose="020B0604020202020204" pitchFamily="34" charset="0"/>
+                <a:cs typeface="Arial" panose="020B0604020202020204" pitchFamily="34" charset="0"/>
+              </a:rPr>
+              <a:t>Device</a:t>
             </a:r>
             <a:endParaRPr lang="en-US" sz="1400" dirty="0">
               <a:latin typeface="Arial" panose="020B0604020202020204" pitchFamily="34" charset="0"/>
@@ -8121,14 +8112,7 @@
                 <a:latin typeface="Arial" panose="020B0604020202020204" pitchFamily="34" charset="0"/>
                 <a:cs typeface="Arial" panose="020B0604020202020204" pitchFamily="34" charset="0"/>
               </a:rPr>
-              <a:t>Application-specific s</a:t>
-            </a:r>
-            <a:r>
-              <a:rPr lang="en-US" sz="1200" dirty="0" smtClean="0">
-                <a:latin typeface="Arial" panose="020B0604020202020204" pitchFamily="34" charset="0"/>
-                <a:cs typeface="Arial" panose="020B0604020202020204" pitchFamily="34" charset="0"/>
-              </a:rPr>
-              <a:t>ession</a:t>
+              <a:t>Application-specific session</a:t>
             </a:r>
             <a:endParaRPr lang="en-US" sz="1200" dirty="0">
               <a:latin typeface="Arial" panose="020B0604020202020204" pitchFamily="34" charset="0"/>
@@ -8737,6 +8721,259 @@
     <p:extLst>
       <p:ext uri="{BB962C8B-B14F-4D97-AF65-F5344CB8AC3E}">
         <p14:creationId xmlns:p14="http://schemas.microsoft.com/office/powerpoint/2010/main" val="3515459657"/>
+      </p:ext>
+    </p:extLst>
+  </p:cSld>
+  <p:clrMapOvr>
+    <a:masterClrMapping/>
+  </p:clrMapOvr>
+  <p:timing>
+    <p:tnLst>
+      <p:par>
+        <p:cTn id="1" dur="indefinite" restart="never" nodeType="tmRoot"/>
+      </p:par>
+    </p:tnLst>
+  </p:timing>
+</p:sld>
+</file>
+
+<file path=ppt/slides/slide4.xml><?xml version="1.0" encoding="utf-8"?>
+<p:sld xmlns:a="http://schemas.openxmlformats.org/drawingml/2006/main" xmlns:r="http://schemas.openxmlformats.org/officeDocument/2006/relationships" xmlns:p="http://schemas.openxmlformats.org/presentationml/2006/main">
+  <p:cSld>
+    <p:spTree>
+      <p:nvGrpSpPr>
+        <p:cNvPr id="1" name=""/>
+        <p:cNvGrpSpPr/>
+        <p:nvPr/>
+      </p:nvGrpSpPr>
+      <p:grpSpPr>
+        <a:xfrm>
+          <a:off x="0" y="0"/>
+          <a:ext cx="0" cy="0"/>
+          <a:chOff x="0" y="0"/>
+          <a:chExt cx="0" cy="0"/>
+        </a:xfrm>
+      </p:grpSpPr>
+      <p:sp>
+        <p:nvSpPr>
+          <p:cNvPr id="11" name="TextBox 10"/>
+          <p:cNvSpPr txBox="1"/>
+          <p:nvPr/>
+        </p:nvSpPr>
+        <p:spPr>
+          <a:xfrm>
+            <a:off x="2415884" y="292586"/>
+            <a:ext cx="4115294" cy="461665"/>
+          </a:xfrm>
+          <a:prstGeom prst="rect">
+            <a:avLst/>
+          </a:prstGeom>
+          <a:noFill/>
+        </p:spPr>
+        <p:txBody>
+          <a:bodyPr wrap="none" rtlCol="0">
+            <a:spAutoFit/>
+          </a:bodyPr>
+          <a:lstStyle/>
+          <a:p>
+            <a:pPr algn="ctr"/>
+            <a:r>
+              <a:rPr lang="en-US" sz="2400" dirty="0" err="1" smtClean="0">
+                <a:latin typeface="Times New Roman" panose="02020603050405020304" pitchFamily="18" charset="0"/>
+                <a:cs typeface="Times New Roman" panose="02020603050405020304" pitchFamily="18" charset="0"/>
+              </a:rPr>
+              <a:t>WebNFC</a:t>
+            </a:r>
+            <a:r>
+              <a:rPr lang="en-US" sz="2400" dirty="0" smtClean="0">
+                <a:latin typeface="Times New Roman" panose="02020603050405020304" pitchFamily="18" charset="0"/>
+                <a:cs typeface="Times New Roman" panose="02020603050405020304" pitchFamily="18" charset="0"/>
+              </a:rPr>
+              <a:t> </a:t>
+            </a:r>
+            <a:r>
+              <a:rPr lang="en-US" sz="2400" dirty="0" smtClean="0">
+                <a:latin typeface="Times New Roman" panose="02020603050405020304" pitchFamily="18" charset="0"/>
+                <a:cs typeface="Times New Roman" panose="02020603050405020304" pitchFamily="18" charset="0"/>
+              </a:rPr>
+              <a:t>Bridge – </a:t>
+            </a:r>
+            <a:r>
+              <a:rPr lang="en-US" sz="2400" dirty="0" smtClean="0">
+                <a:latin typeface="Times New Roman" panose="02020603050405020304" pitchFamily="18" charset="0"/>
+                <a:cs typeface="Times New Roman" panose="02020603050405020304" pitchFamily="18" charset="0"/>
+              </a:rPr>
+              <a:t>Applications</a:t>
+            </a:r>
+            <a:endParaRPr lang="en-US" sz="2400" dirty="0">
+              <a:latin typeface="Arial" panose="020B0604020202020204" pitchFamily="34" charset="0"/>
+              <a:cs typeface="Arial" panose="020B0604020202020204" pitchFamily="34" charset="0"/>
+            </a:endParaRPr>
+          </a:p>
+        </p:txBody>
+      </p:sp>
+      <p:sp>
+        <p:nvSpPr>
+          <p:cNvPr id="3" name="TextBox 2"/>
+          <p:cNvSpPr txBox="1"/>
+          <p:nvPr/>
+        </p:nvSpPr>
+        <p:spPr>
+          <a:xfrm>
+            <a:off x="1350159" y="1844824"/>
+            <a:ext cx="5195846" cy="3247043"/>
+          </a:xfrm>
+          <a:prstGeom prst="rect">
+            <a:avLst/>
+          </a:prstGeom>
+          <a:noFill/>
+        </p:spPr>
+        <p:txBody>
+          <a:bodyPr wrap="none" rtlCol="0">
+            <a:spAutoFit/>
+          </a:bodyPr>
+          <a:lstStyle/>
+          <a:p>
+            <a:pPr marL="285750" indent="-285750">
+              <a:spcAft>
+                <a:spcPts val="600"/>
+              </a:spcAft>
+              <a:buFont typeface="Arial" panose="020B0604020202020204" pitchFamily="34" charset="0"/>
+              <a:buChar char="•"/>
+            </a:pPr>
+            <a:r>
+              <a:rPr lang="en-US" sz="2000" dirty="0" smtClean="0">
+                <a:latin typeface="Times New Roman" panose="02020603050405020304" pitchFamily="18" charset="0"/>
+                <a:cs typeface="Times New Roman" panose="02020603050405020304" pitchFamily="18" charset="0"/>
+              </a:rPr>
+              <a:t>Secure Web Payments</a:t>
+            </a:r>
+          </a:p>
+          <a:p>
+            <a:pPr marL="285750" indent="-285750">
+              <a:spcAft>
+                <a:spcPts val="600"/>
+              </a:spcAft>
+              <a:buFont typeface="Arial" panose="020B0604020202020204" pitchFamily="34" charset="0"/>
+              <a:buChar char="•"/>
+            </a:pPr>
+            <a:r>
+              <a:rPr lang="en-US" sz="2000" dirty="0" smtClean="0">
+                <a:latin typeface="Times New Roman" panose="02020603050405020304" pitchFamily="18" charset="0"/>
+                <a:cs typeface="Times New Roman" panose="02020603050405020304" pitchFamily="18" charset="0"/>
+              </a:rPr>
+              <a:t>User Authentication</a:t>
+            </a:r>
+          </a:p>
+          <a:p>
+            <a:pPr marL="285750" indent="-285750">
+              <a:spcAft>
+                <a:spcPts val="600"/>
+              </a:spcAft>
+              <a:buFont typeface="Arial" panose="020B0604020202020204" pitchFamily="34" charset="0"/>
+              <a:buChar char="•"/>
+            </a:pPr>
+            <a:r>
+              <a:rPr lang="en-US" sz="2000" dirty="0" smtClean="0">
+                <a:latin typeface="Times New Roman" panose="02020603050405020304" pitchFamily="18" charset="0"/>
+                <a:cs typeface="Times New Roman" panose="02020603050405020304" pitchFamily="18" charset="0"/>
+              </a:rPr>
+              <a:t>Supplying User-data</a:t>
+            </a:r>
+          </a:p>
+          <a:p>
+            <a:pPr marL="285750" indent="-285750">
+              <a:spcAft>
+                <a:spcPts val="600"/>
+              </a:spcAft>
+              <a:buFont typeface="Arial" panose="020B0604020202020204" pitchFamily="34" charset="0"/>
+              <a:buChar char="•"/>
+            </a:pPr>
+            <a:r>
+              <a:rPr lang="en-US" sz="2000" dirty="0" smtClean="0">
+                <a:latin typeface="Times New Roman" panose="02020603050405020304" pitchFamily="18" charset="0"/>
+                <a:cs typeface="Times New Roman" panose="02020603050405020304" pitchFamily="18" charset="0"/>
+              </a:rPr>
+              <a:t>Games</a:t>
+            </a:r>
+          </a:p>
+          <a:p>
+            <a:pPr marL="285750" indent="-285750">
+              <a:spcAft>
+                <a:spcPts val="600"/>
+              </a:spcAft>
+              <a:buFont typeface="Arial" panose="020B0604020202020204" pitchFamily="34" charset="0"/>
+              <a:buChar char="•"/>
+            </a:pPr>
+            <a:r>
+              <a:rPr lang="en-US" sz="2000" dirty="0" smtClean="0">
+                <a:latin typeface="Times New Roman" panose="02020603050405020304" pitchFamily="18" charset="0"/>
+                <a:cs typeface="Times New Roman" panose="02020603050405020304" pitchFamily="18" charset="0"/>
+              </a:rPr>
+              <a:t>Virtual Passports &amp; Visas</a:t>
+            </a:r>
+          </a:p>
+          <a:p>
+            <a:pPr marL="285750" indent="-285750">
+              <a:spcAft>
+                <a:spcPts val="600"/>
+              </a:spcAft>
+              <a:buFont typeface="Arial" panose="020B0604020202020204" pitchFamily="34" charset="0"/>
+              <a:buChar char="•"/>
+            </a:pPr>
+            <a:r>
+              <a:rPr lang="en-US" sz="2000" dirty="0" smtClean="0">
+                <a:latin typeface="Times New Roman" panose="02020603050405020304" pitchFamily="18" charset="0"/>
+                <a:cs typeface="Times New Roman" panose="02020603050405020304" pitchFamily="18" charset="0"/>
+              </a:rPr>
+              <a:t>Boarding Cards</a:t>
+            </a:r>
+          </a:p>
+          <a:p>
+            <a:pPr marL="285750" indent="-285750">
+              <a:spcAft>
+                <a:spcPts val="600"/>
+              </a:spcAft>
+              <a:buFont typeface="Arial" panose="020B0604020202020204" pitchFamily="34" charset="0"/>
+              <a:buChar char="•"/>
+            </a:pPr>
+            <a:r>
+              <a:rPr lang="en-US" sz="2000" dirty="0" smtClean="0">
+                <a:latin typeface="Times New Roman" panose="02020603050405020304" pitchFamily="18" charset="0"/>
+                <a:cs typeface="Times New Roman" panose="02020603050405020304" pitchFamily="18" charset="0"/>
+              </a:rPr>
+              <a:t>Interaction with TVs including remote control</a:t>
+            </a:r>
+            <a:endParaRPr lang="en-US" sz="2000" dirty="0">
+              <a:latin typeface="Times New Roman" panose="02020603050405020304" pitchFamily="18" charset="0"/>
+              <a:cs typeface="Times New Roman" panose="02020603050405020304" pitchFamily="18" charset="0"/>
+            </a:endParaRPr>
+          </a:p>
+          <a:p>
+            <a:pPr marL="285750" indent="-285750">
+              <a:spcBef>
+                <a:spcPts val="1200"/>
+              </a:spcBef>
+              <a:spcAft>
+                <a:spcPts val="600"/>
+              </a:spcAft>
+              <a:buFont typeface="Arial" panose="020B0604020202020204" pitchFamily="34" charset="0"/>
+              <a:buChar char="•"/>
+            </a:pPr>
+            <a:r>
+              <a:rPr lang="en-US" sz="2000" dirty="0" smtClean="0">
+                <a:latin typeface="Times New Roman" panose="02020603050405020304" pitchFamily="18" charset="0"/>
+                <a:cs typeface="Times New Roman" panose="02020603050405020304" pitchFamily="18" charset="0"/>
+              </a:rPr>
+              <a:t>You name it…</a:t>
+            </a:r>
+          </a:p>
+        </p:txBody>
+      </p:sp>
+    </p:spTree>
+    <p:extLst>
+      <p:ext uri="{BB962C8B-B14F-4D97-AF65-F5344CB8AC3E}">
+        <p14:creationId xmlns:p14="http://schemas.microsoft.com/office/powerpoint/2010/main" val="133680716"/>
       </p:ext>
     </p:extLst>
   </p:cSld>

</xml_diff>

<commit_message>
Added more meat to the web2nfc specification
</commit_message>
<xml_diff>
--- a/resources/docs/webnfc--web2device-bridge.pptx
+++ b/resources/docs/webnfc--web2device-bridge.pptx
@@ -5,13 +5,15 @@
     <p:sldMasterId id="2147483648" r:id="rId1"/>
   </p:sldMasterIdLst>
   <p:handoutMasterIdLst>
-    <p:handoutMasterId r:id="rId6"/>
+    <p:handoutMasterId r:id="rId8"/>
   </p:handoutMasterIdLst>
   <p:sldIdLst>
     <p:sldId id="261" r:id="rId2"/>
     <p:sldId id="262" r:id="rId3"/>
-    <p:sldId id="259" r:id="rId4"/>
-    <p:sldId id="263" r:id="rId5"/>
+    <p:sldId id="265" r:id="rId4"/>
+    <p:sldId id="264" r:id="rId5"/>
+    <p:sldId id="266" r:id="rId6"/>
+    <p:sldId id="263" r:id="rId7"/>
   </p:sldIdLst>
   <p:sldSz cx="9144000" cy="6858000" type="screen4x3"/>
   <p:notesSz cx="6858000" cy="9144000"/>
@@ -195,7 +197,7 @@
           <a:p>
             <a:fld id="{07A00844-99C3-4B4D-8665-83D6466F1606}" type="datetimeFigureOut">
               <a:rPr lang="en-US" smtClean="0"/>
-              <a:t>2015-04-22</a:t>
+              <a:t>2015-04-26</a:t>
             </a:fld>
             <a:endParaRPr lang="en-US"/>
           </a:p>
@@ -473,7 +475,7 @@
           <a:p>
             <a:fld id="{A1FD92F6-7B59-47F7-9C80-4F94E0E83D60}" type="datetimeFigureOut">
               <a:rPr lang="en-US" smtClean="0"/>
-              <a:t>2015-04-22</a:t>
+              <a:t>2015-04-26</a:t>
             </a:fld>
             <a:endParaRPr lang="en-US"/>
           </a:p>
@@ -690,7 +692,7 @@
           <a:p>
             <a:fld id="{A1FD92F6-7B59-47F7-9C80-4F94E0E83D60}" type="datetimeFigureOut">
               <a:rPr lang="en-US" smtClean="0"/>
-              <a:t>2015-04-22</a:t>
+              <a:t>2015-04-26</a:t>
             </a:fld>
             <a:endParaRPr lang="en-US"/>
           </a:p>
@@ -900,7 +902,7 @@
           <a:p>
             <a:fld id="{A1FD92F6-7B59-47F7-9C80-4F94E0E83D60}" type="datetimeFigureOut">
               <a:rPr lang="en-US" smtClean="0"/>
-              <a:t>2015-04-22</a:t>
+              <a:t>2015-04-26</a:t>
             </a:fld>
             <a:endParaRPr lang="en-US"/>
           </a:p>
@@ -1185,7 +1187,7 @@
           <a:p>
             <a:fld id="{A1FD92F6-7B59-47F7-9C80-4F94E0E83D60}" type="datetimeFigureOut">
               <a:rPr lang="en-US" smtClean="0"/>
-              <a:t>2015-04-22</a:t>
+              <a:t>2015-04-26</a:t>
             </a:fld>
             <a:endParaRPr lang="en-US"/>
           </a:p>
@@ -1468,7 +1470,7 @@
           <a:p>
             <a:fld id="{A1FD92F6-7B59-47F7-9C80-4F94E0E83D60}" type="datetimeFigureOut">
               <a:rPr lang="en-US" smtClean="0"/>
-              <a:t>2015-04-22</a:t>
+              <a:t>2015-04-26</a:t>
             </a:fld>
             <a:endParaRPr lang="en-US"/>
           </a:p>
@@ -1801,7 +1803,7 @@
           <a:p>
             <a:fld id="{A1FD92F6-7B59-47F7-9C80-4F94E0E83D60}" type="datetimeFigureOut">
               <a:rPr lang="en-US" smtClean="0"/>
-              <a:t>2015-04-22</a:t>
+              <a:t>2015-04-26</a:t>
             </a:fld>
             <a:endParaRPr lang="en-US"/>
           </a:p>
@@ -2267,7 +2269,7 @@
           <a:p>
             <a:fld id="{A1FD92F6-7B59-47F7-9C80-4F94E0E83D60}" type="datetimeFigureOut">
               <a:rPr lang="en-US" smtClean="0"/>
-              <a:t>2015-04-22</a:t>
+              <a:t>2015-04-26</a:t>
             </a:fld>
             <a:endParaRPr lang="en-US"/>
           </a:p>
@@ -2417,7 +2419,7 @@
           <a:p>
             <a:fld id="{A1FD92F6-7B59-47F7-9C80-4F94E0E83D60}" type="datetimeFigureOut">
               <a:rPr lang="en-US" smtClean="0"/>
-              <a:t>2015-04-22</a:t>
+              <a:t>2015-04-26</a:t>
             </a:fld>
             <a:endParaRPr lang="en-US"/>
           </a:p>
@@ -2536,7 +2538,7 @@
           <a:p>
             <a:fld id="{A1FD92F6-7B59-47F7-9C80-4F94E0E83D60}" type="datetimeFigureOut">
               <a:rPr lang="en-US" smtClean="0"/>
-              <a:t>2015-04-22</a:t>
+              <a:t>2015-04-26</a:t>
             </a:fld>
             <a:endParaRPr lang="en-US"/>
           </a:p>
@@ -2846,7 +2848,7 @@
           <a:p>
             <a:fld id="{A1FD92F6-7B59-47F7-9C80-4F94E0E83D60}" type="datetimeFigureOut">
               <a:rPr lang="en-US" smtClean="0"/>
-              <a:t>2015-04-22</a:t>
+              <a:t>2015-04-26</a:t>
             </a:fld>
             <a:endParaRPr lang="en-US"/>
           </a:p>
@@ -3132,7 +3134,7 @@
           <a:p>
             <a:fld id="{A1FD92F6-7B59-47F7-9C80-4F94E0E83D60}" type="datetimeFigureOut">
               <a:rPr lang="en-US" smtClean="0"/>
-              <a:t>2015-04-22</a:t>
+              <a:t>2015-04-26</a:t>
             </a:fld>
             <a:endParaRPr lang="en-US"/>
           </a:p>
@@ -3279,8 +3281,19 @@
                 <a:latin typeface="Arial" panose="020B0604020202020204" pitchFamily="34" charset="0"/>
                 <a:cs typeface="Arial" panose="020B0604020202020204" pitchFamily="34" charset="0"/>
               </a:rPr>
-              <a:t>, WebPKI.org, V0.52, 2015-04-18</a:t>
-            </a:r>
+              <a:t>, WebPKI.org, </a:t>
+            </a:r>
+            <a:r>
+              <a:rPr lang="en-US" sz="600" baseline="0" dirty="0" smtClean="0">
+                <a:latin typeface="Arial" panose="020B0604020202020204" pitchFamily="34" charset="0"/>
+                <a:cs typeface="Arial" panose="020B0604020202020204" pitchFamily="34" charset="0"/>
+              </a:rPr>
+              <a:t>V0.53, 2015-04-26</a:t>
+            </a:r>
+            <a:endParaRPr lang="en-US" sz="600" baseline="0" dirty="0" smtClean="0">
+              <a:latin typeface="Arial" panose="020B0604020202020204" pitchFamily="34" charset="0"/>
+              <a:cs typeface="Arial" panose="020B0604020202020204" pitchFamily="34" charset="0"/>
+            </a:endParaRPr>
           </a:p>
         </p:txBody>
       </p:sp>
@@ -3326,7 +3339,7 @@
                 <a:latin typeface="Arial" panose="020B0604020202020204" pitchFamily="34" charset="0"/>
                 <a:cs typeface="Arial" panose="020B0604020202020204" pitchFamily="34" charset="0"/>
               </a:rPr>
-              <a:t>/4</a:t>
+              <a:t>/6</a:t>
             </a:r>
             <a:endParaRPr lang="en-US" sz="600" dirty="0">
               <a:latin typeface="Arial" panose="020B0604020202020204" pitchFamily="34" charset="0"/>
@@ -3926,21 +3939,7 @@
                 <a:latin typeface="Arial" panose="020B0604020202020204" pitchFamily="34" charset="0"/>
                 <a:cs typeface="Arial" panose="020B0604020202020204" pitchFamily="34" charset="0"/>
               </a:rPr>
-              <a:t>there </a:t>
-            </a:r>
-            <a:r>
-              <a:rPr lang="en-US" sz="1600" smtClean="0">
-                <a:latin typeface="Arial" panose="020B0604020202020204" pitchFamily="34" charset="0"/>
-                <a:cs typeface="Arial" panose="020B0604020202020204" pitchFamily="34" charset="0"/>
-              </a:rPr>
-              <a:t>would be</a:t>
-            </a:r>
-            <a:r>
-              <a:rPr lang="en-US" sz="1600" smtClean="0">
-                <a:latin typeface="Arial" panose="020B0604020202020204" pitchFamily="34" charset="0"/>
-                <a:cs typeface="Arial" panose="020B0604020202020204" pitchFamily="34" charset="0"/>
-              </a:rPr>
-              <a:t> </a:t>
+              <a:t>there would be </a:t>
             </a:r>
             <a:r>
               <a:rPr lang="en-US" sz="1600" dirty="0" smtClean="0">
@@ -4258,7 +4257,28 @@
                 <a:latin typeface="Arial" panose="020B0604020202020204" pitchFamily="34" charset="0"/>
                 <a:cs typeface="Arial" panose="020B0604020202020204" pitchFamily="34" charset="0"/>
               </a:rPr>
-              <a:t>User interacts with a Web application on a PC, POS terminal, Vending machine, etc.</a:t>
+              <a:t>User interacts with a Web application on a PC</a:t>
+            </a:r>
+            <a:r>
+              <a:rPr lang="en-US" sz="1000" smtClean="0">
+                <a:latin typeface="Arial" panose="020B0604020202020204" pitchFamily="34" charset="0"/>
+                <a:cs typeface="Arial" panose="020B0604020202020204" pitchFamily="34" charset="0"/>
+              </a:rPr>
+              <a:t>, </a:t>
+            </a:r>
+            <a:r>
+              <a:rPr lang="en-US" sz="1000" smtClean="0">
+                <a:latin typeface="Arial" panose="020B0604020202020204" pitchFamily="34" charset="0"/>
+                <a:cs typeface="Arial" panose="020B0604020202020204" pitchFamily="34" charset="0"/>
+              </a:rPr>
+              <a:t>ATM, POS </a:t>
+            </a:r>
+            <a:r>
+              <a:rPr lang="en-US" sz="1000" dirty="0" smtClean="0">
+                <a:latin typeface="Arial" panose="020B0604020202020204" pitchFamily="34" charset="0"/>
+                <a:cs typeface="Arial" panose="020B0604020202020204" pitchFamily="34" charset="0"/>
+              </a:rPr>
+              <a:t>terminal, Vending machine, etc.</a:t>
             </a:r>
           </a:p>
         </p:txBody>
@@ -7265,6 +7285,943 @@
       </p:grpSpPr>
       <p:sp>
         <p:nvSpPr>
+          <p:cNvPr id="39" name="TextBox 38"/>
+          <p:cNvSpPr txBox="1"/>
+          <p:nvPr/>
+        </p:nvSpPr>
+        <p:spPr>
+          <a:xfrm>
+            <a:off x="2200154" y="292586"/>
+            <a:ext cx="4546759" cy="461665"/>
+          </a:xfrm>
+          <a:prstGeom prst="rect">
+            <a:avLst/>
+          </a:prstGeom>
+          <a:noFill/>
+        </p:spPr>
+        <p:txBody>
+          <a:bodyPr wrap="none" rtlCol="0">
+            <a:spAutoFit/>
+          </a:bodyPr>
+          <a:lstStyle/>
+          <a:p>
+            <a:pPr algn="ctr"/>
+            <a:r>
+              <a:rPr lang="en-US" sz="2400" dirty="0" err="1" smtClean="0">
+                <a:latin typeface="Times New Roman" panose="02020603050405020304" pitchFamily="18" charset="0"/>
+                <a:cs typeface="Times New Roman" panose="02020603050405020304" pitchFamily="18" charset="0"/>
+              </a:rPr>
+              <a:t>WebNFC</a:t>
+            </a:r>
+            <a:r>
+              <a:rPr lang="en-US" sz="2400" dirty="0" smtClean="0">
+                <a:latin typeface="Times New Roman" panose="02020603050405020304" pitchFamily="18" charset="0"/>
+                <a:cs typeface="Times New Roman" panose="02020603050405020304" pitchFamily="18" charset="0"/>
+              </a:rPr>
+              <a:t> Bridge – Web Side Agent</a:t>
+            </a:r>
+            <a:endParaRPr lang="en-US" sz="2400" dirty="0">
+              <a:latin typeface="Arial" panose="020B0604020202020204" pitchFamily="34" charset="0"/>
+              <a:cs typeface="Arial" panose="020B0604020202020204" pitchFamily="34" charset="0"/>
+            </a:endParaRPr>
+          </a:p>
+        </p:txBody>
+      </p:sp>
+      <p:grpSp>
+        <p:nvGrpSpPr>
+          <p:cNvPr id="5" name="Group 4"/>
+          <p:cNvGrpSpPr/>
+          <p:nvPr/>
+        </p:nvGrpSpPr>
+        <p:grpSpPr>
+          <a:xfrm>
+            <a:off x="870223" y="908720"/>
+            <a:ext cx="3024336" cy="1872208"/>
+            <a:chOff x="539552" y="908720"/>
+            <a:chExt cx="3024336" cy="1872208"/>
+          </a:xfrm>
+          <a:effectLst>
+            <a:outerShdw blurRad="50800" dist="38100" dir="2700000" algn="tl" rotWithShape="0">
+              <a:prstClr val="black">
+                <a:alpha val="40000"/>
+              </a:prstClr>
+            </a:outerShdw>
+          </a:effectLst>
+        </p:grpSpPr>
+        <p:sp>
+          <p:nvSpPr>
+            <p:cNvPr id="21" name="Rectangle 20"/>
+            <p:cNvSpPr/>
+            <p:nvPr/>
+          </p:nvSpPr>
+          <p:spPr>
+            <a:xfrm>
+              <a:off x="539552" y="1228778"/>
+              <a:ext cx="3024336" cy="1552150"/>
+            </a:xfrm>
+            <a:prstGeom prst="rect">
+              <a:avLst/>
+            </a:prstGeom>
+            <a:solidFill>
+              <a:schemeClr val="bg1"/>
+            </a:solidFill>
+            <a:ln w="6350">
+              <a:solidFill>
+                <a:schemeClr val="bg1">
+                  <a:lumMod val="50000"/>
+                </a:schemeClr>
+              </a:solidFill>
+            </a:ln>
+          </p:spPr>
+          <p:style>
+            <a:lnRef idx="2">
+              <a:schemeClr val="accent1">
+                <a:shade val="50000"/>
+              </a:schemeClr>
+            </a:lnRef>
+            <a:fillRef idx="1">
+              <a:schemeClr val="accent1"/>
+            </a:fillRef>
+            <a:effectRef idx="0">
+              <a:schemeClr val="accent1"/>
+            </a:effectRef>
+            <a:fontRef idx="minor">
+              <a:schemeClr val="lt1"/>
+            </a:fontRef>
+          </p:style>
+          <p:txBody>
+            <a:bodyPr rtlCol="0" anchor="ctr"/>
+            <a:lstStyle/>
+            <a:p>
+              <a:pPr algn="ctr"/>
+              <a:endParaRPr lang="en-US"/>
+            </a:p>
+          </p:txBody>
+        </p:sp>
+        <p:sp>
+          <p:nvSpPr>
+            <p:cNvPr id="22" name="Rectangle 21"/>
+            <p:cNvSpPr/>
+            <p:nvPr/>
+          </p:nvSpPr>
+          <p:spPr>
+            <a:xfrm>
+              <a:off x="539552" y="908720"/>
+              <a:ext cx="3024336" cy="320058"/>
+            </a:xfrm>
+            <a:prstGeom prst="rect">
+              <a:avLst/>
+            </a:prstGeom>
+            <a:gradFill flip="none" rotWithShape="1">
+              <a:gsLst>
+                <a:gs pos="0">
+                  <a:schemeClr val="accent1">
+                    <a:tint val="66000"/>
+                    <a:satMod val="160000"/>
+                  </a:schemeClr>
+                </a:gs>
+                <a:gs pos="50000">
+                  <a:schemeClr val="accent1">
+                    <a:tint val="44500"/>
+                    <a:satMod val="160000"/>
+                  </a:schemeClr>
+                </a:gs>
+                <a:gs pos="100000">
+                  <a:srgbClr val="BDCDE9"/>
+                </a:gs>
+              </a:gsLst>
+              <a:lin ang="5400000" scaled="1"/>
+              <a:tileRect/>
+            </a:gradFill>
+            <a:ln w="6350">
+              <a:solidFill>
+                <a:schemeClr val="bg1">
+                  <a:lumMod val="50000"/>
+                </a:schemeClr>
+              </a:solidFill>
+            </a:ln>
+          </p:spPr>
+          <p:style>
+            <a:lnRef idx="2">
+              <a:schemeClr val="accent1">
+                <a:shade val="50000"/>
+              </a:schemeClr>
+            </a:lnRef>
+            <a:fillRef idx="1">
+              <a:schemeClr val="accent1"/>
+            </a:fillRef>
+            <a:effectRef idx="0">
+              <a:schemeClr val="accent1"/>
+            </a:effectRef>
+            <a:fontRef idx="minor">
+              <a:schemeClr val="lt1"/>
+            </a:fontRef>
+          </p:style>
+          <p:txBody>
+            <a:bodyPr rtlCol="0" anchor="ctr"/>
+            <a:lstStyle/>
+            <a:p>
+              <a:pPr algn="ctr"/>
+              <a:endParaRPr lang="en-US"/>
+            </a:p>
+          </p:txBody>
+        </p:sp>
+        <p:sp>
+          <p:nvSpPr>
+            <p:cNvPr id="24" name="TextBox 23"/>
+            <p:cNvSpPr txBox="1"/>
+            <p:nvPr/>
+          </p:nvSpPr>
+          <p:spPr>
+            <a:xfrm>
+              <a:off x="683569" y="962193"/>
+              <a:ext cx="2592287" cy="206011"/>
+            </a:xfrm>
+            <a:prstGeom prst="roundRect">
+              <a:avLst/>
+            </a:prstGeom>
+            <a:solidFill>
+              <a:schemeClr val="bg1"/>
+            </a:solidFill>
+            <a:ln w="6350" cmpd="sng">
+              <a:solidFill>
+                <a:schemeClr val="tx1"/>
+              </a:solidFill>
+            </a:ln>
+          </p:spPr>
+          <p:txBody>
+            <a:bodyPr wrap="square" lIns="72000" tIns="54000" bIns="72000" rtlCol="0" anchor="ctr" anchorCtr="0">
+              <a:noAutofit/>
+            </a:bodyPr>
+            <a:lstStyle/>
+            <a:p>
+              <a:r>
+                <a:rPr lang="en-US" sz="1300" dirty="0" smtClean="0">
+                  <a:latin typeface="Arial" panose="020B0604020202020204" pitchFamily="34" charset="0"/>
+                  <a:cs typeface="Arial" panose="020B0604020202020204" pitchFamily="34" charset="0"/>
+                </a:rPr>
+                <a:t>https://merchant.com/checkout</a:t>
+              </a:r>
+              <a:endParaRPr lang="en-US" sz="1300" dirty="0">
+                <a:latin typeface="Arial" panose="020B0604020202020204" pitchFamily="34" charset="0"/>
+                <a:cs typeface="Arial" panose="020B0604020202020204" pitchFamily="34" charset="0"/>
+              </a:endParaRPr>
+            </a:p>
+          </p:txBody>
+        </p:sp>
+        <p:sp>
+          <p:nvSpPr>
+            <p:cNvPr id="41" name="Text Box 2"/>
+            <p:cNvSpPr txBox="1">
+              <a:spLocks noChangeArrowheads="1"/>
+            </p:cNvSpPr>
+            <p:nvPr/>
+          </p:nvSpPr>
+          <p:spPr bwMode="auto">
+            <a:xfrm>
+              <a:off x="1094448" y="1438322"/>
+              <a:ext cx="1974382" cy="262486"/>
+            </a:xfrm>
+            <a:prstGeom prst="rect">
+              <a:avLst/>
+            </a:prstGeom>
+            <a:noFill/>
+            <a:ln w="9525">
+              <a:noFill/>
+              <a:miter lim="800000"/>
+              <a:headEnd/>
+              <a:tailEnd/>
+            </a:ln>
+          </p:spPr>
+          <p:txBody>
+            <a:bodyPr rot="0" vert="horz" wrap="square" lIns="91440" tIns="45720" rIns="91440" bIns="45720" anchor="t" anchorCtr="0">
+              <a:noAutofit/>
+            </a:bodyPr>
+            <a:lstStyle>
+              <a:defPPr>
+                <a:defRPr lang="en-US"/>
+              </a:defPPr>
+              <a:lvl1pPr marL="0" algn="l" defTabSz="914400" rtl="0" eaLnBrk="1" latinLnBrk="0" hangingPunct="1">
+                <a:defRPr sz="1800" kern="1200">
+                  <a:solidFill>
+                    <a:schemeClr val="tx1"/>
+                  </a:solidFill>
+                  <a:latin typeface="+mn-lt"/>
+                  <a:ea typeface="+mn-ea"/>
+                  <a:cs typeface="+mn-cs"/>
+                </a:defRPr>
+              </a:lvl1pPr>
+              <a:lvl2pPr marL="457200" algn="l" defTabSz="914400" rtl="0" eaLnBrk="1" latinLnBrk="0" hangingPunct="1">
+                <a:defRPr sz="1800" kern="1200">
+                  <a:solidFill>
+                    <a:schemeClr val="tx1"/>
+                  </a:solidFill>
+                  <a:latin typeface="+mn-lt"/>
+                  <a:ea typeface="+mn-ea"/>
+                  <a:cs typeface="+mn-cs"/>
+                </a:defRPr>
+              </a:lvl2pPr>
+              <a:lvl3pPr marL="914400" algn="l" defTabSz="914400" rtl="0" eaLnBrk="1" latinLnBrk="0" hangingPunct="1">
+                <a:defRPr sz="1800" kern="1200">
+                  <a:solidFill>
+                    <a:schemeClr val="tx1"/>
+                  </a:solidFill>
+                  <a:latin typeface="+mn-lt"/>
+                  <a:ea typeface="+mn-ea"/>
+                  <a:cs typeface="+mn-cs"/>
+                </a:defRPr>
+              </a:lvl3pPr>
+              <a:lvl4pPr marL="1371600" algn="l" defTabSz="914400" rtl="0" eaLnBrk="1" latinLnBrk="0" hangingPunct="1">
+                <a:defRPr sz="1800" kern="1200">
+                  <a:solidFill>
+                    <a:schemeClr val="tx1"/>
+                  </a:solidFill>
+                  <a:latin typeface="+mn-lt"/>
+                  <a:ea typeface="+mn-ea"/>
+                  <a:cs typeface="+mn-cs"/>
+                </a:defRPr>
+              </a:lvl4pPr>
+              <a:lvl5pPr marL="1828800" algn="l" defTabSz="914400" rtl="0" eaLnBrk="1" latinLnBrk="0" hangingPunct="1">
+                <a:defRPr sz="1800" kern="1200">
+                  <a:solidFill>
+                    <a:schemeClr val="tx1"/>
+                  </a:solidFill>
+                  <a:latin typeface="+mn-lt"/>
+                  <a:ea typeface="+mn-ea"/>
+                  <a:cs typeface="+mn-cs"/>
+                </a:defRPr>
+              </a:lvl5pPr>
+              <a:lvl6pPr marL="2286000" algn="l" defTabSz="914400" rtl="0" eaLnBrk="1" latinLnBrk="0" hangingPunct="1">
+                <a:defRPr sz="1800" kern="1200">
+                  <a:solidFill>
+                    <a:schemeClr val="tx1"/>
+                  </a:solidFill>
+                  <a:latin typeface="+mn-lt"/>
+                  <a:ea typeface="+mn-ea"/>
+                  <a:cs typeface="+mn-cs"/>
+                </a:defRPr>
+              </a:lvl6pPr>
+              <a:lvl7pPr marL="2743200" algn="l" defTabSz="914400" rtl="0" eaLnBrk="1" latinLnBrk="0" hangingPunct="1">
+                <a:defRPr sz="1800" kern="1200">
+                  <a:solidFill>
+                    <a:schemeClr val="tx1"/>
+                  </a:solidFill>
+                  <a:latin typeface="+mn-lt"/>
+                  <a:ea typeface="+mn-ea"/>
+                  <a:cs typeface="+mn-cs"/>
+                </a:defRPr>
+              </a:lvl7pPr>
+              <a:lvl8pPr marL="3200400" algn="l" defTabSz="914400" rtl="0" eaLnBrk="1" latinLnBrk="0" hangingPunct="1">
+                <a:defRPr sz="1800" kern="1200">
+                  <a:solidFill>
+                    <a:schemeClr val="tx1"/>
+                  </a:solidFill>
+                  <a:latin typeface="+mn-lt"/>
+                  <a:ea typeface="+mn-ea"/>
+                  <a:cs typeface="+mn-cs"/>
+                </a:defRPr>
+              </a:lvl8pPr>
+              <a:lvl9pPr marL="3657600" algn="l" defTabSz="914400" rtl="0" eaLnBrk="1" latinLnBrk="0" hangingPunct="1">
+                <a:defRPr sz="1800" kern="1200">
+                  <a:solidFill>
+                    <a:schemeClr val="tx1"/>
+                  </a:solidFill>
+                  <a:latin typeface="+mn-lt"/>
+                  <a:ea typeface="+mn-ea"/>
+                  <a:cs typeface="+mn-cs"/>
+                </a:defRPr>
+              </a:lvl9pPr>
+            </a:lstStyle>
+            <a:p>
+              <a:pPr algn="ctr">
+                <a:lnSpc>
+                  <a:spcPct val="115000"/>
+                </a:lnSpc>
+                <a:spcAft>
+                  <a:spcPts val="1000"/>
+                </a:spcAft>
+              </a:pPr>
+              <a:r>
+                <a:rPr lang="en-US" sz="1000" dirty="0" smtClean="0">
+                  <a:effectLst/>
+                  <a:latin typeface="Arial"/>
+                  <a:ea typeface="Calibri"/>
+                  <a:cs typeface="Times New Roman"/>
+                </a:rPr>
+                <a:t>Amount to pay: $275.00</a:t>
+              </a:r>
+              <a:endParaRPr lang="en-US" sz="1000" dirty="0">
+                <a:effectLst/>
+                <a:latin typeface="Times New Roman"/>
+                <a:ea typeface="Times New Roman"/>
+              </a:endParaRPr>
+            </a:p>
+          </p:txBody>
+        </p:sp>
+        <p:pic>
+          <p:nvPicPr>
+            <p:cNvPr id="3" name="Picture 2"/>
+            <p:cNvPicPr>
+              <a:picLocks noChangeAspect="1"/>
+            </p:cNvPicPr>
+            <p:nvPr/>
+          </p:nvPicPr>
+          <p:blipFill>
+            <a:blip r:embed="rId2" cstate="print">
+              <a:extLst>
+                <a:ext uri="{28A0092B-C50C-407E-A947-70E740481C1C}">
+                  <a14:useLocalDpi xmlns:a14="http://schemas.microsoft.com/office/drawing/2010/main" val="0"/>
+                </a:ext>
+              </a:extLst>
+            </a:blip>
+            <a:stretch>
+              <a:fillRect/>
+            </a:stretch>
+          </p:blipFill>
+          <p:spPr>
+            <a:xfrm>
+              <a:off x="1765398" y="1840862"/>
+              <a:ext cx="657922" cy="745000"/>
+            </a:xfrm>
+            <a:prstGeom prst="rect">
+              <a:avLst/>
+            </a:prstGeom>
+          </p:spPr>
+        </p:pic>
+      </p:grpSp>
+      <p:sp>
+        <p:nvSpPr>
+          <p:cNvPr id="2" name="TextBox 1"/>
+          <p:cNvSpPr txBox="1"/>
+          <p:nvPr/>
+        </p:nvSpPr>
+        <p:spPr>
+          <a:xfrm>
+            <a:off x="539552" y="2996952"/>
+            <a:ext cx="7992888" cy="3554819"/>
+          </a:xfrm>
+          <a:prstGeom prst="rect">
+            <a:avLst/>
+          </a:prstGeom>
+          <a:noFill/>
+        </p:spPr>
+        <p:txBody>
+          <a:bodyPr wrap="square" rtlCol="0">
+            <a:spAutoFit/>
+          </a:bodyPr>
+          <a:lstStyle/>
+          <a:p>
+            <a:pPr>
+              <a:spcAft>
+                <a:spcPts val="600"/>
+              </a:spcAft>
+            </a:pPr>
+            <a:r>
+              <a:rPr lang="en-US" sz="1200" dirty="0" smtClean="0">
+                <a:latin typeface="Arial" panose="020B0604020202020204" pitchFamily="34" charset="0"/>
+                <a:cs typeface="Arial" panose="020B0604020202020204" pitchFamily="34" charset="0"/>
+              </a:rPr>
+              <a:t>The </a:t>
+            </a:r>
+            <a:r>
+              <a:rPr lang="en-US" sz="1200" dirty="0" err="1" smtClean="0">
+                <a:latin typeface="Arial" panose="020B0604020202020204" pitchFamily="34" charset="0"/>
+                <a:cs typeface="Arial" panose="020B0604020202020204" pitchFamily="34" charset="0"/>
+              </a:rPr>
+              <a:t>WebNFC</a:t>
+            </a:r>
+            <a:r>
+              <a:rPr lang="en-US" sz="1200" dirty="0" smtClean="0">
+                <a:latin typeface="Arial" panose="020B0604020202020204" pitchFamily="34" charset="0"/>
+                <a:cs typeface="Arial" panose="020B0604020202020204" pitchFamily="34" charset="0"/>
+              </a:rPr>
+              <a:t> Bridge depends on a JavaScript extension in Web-browsers that enables ordinary (untrusted) web-pages to write NFC NDEF records to an NFC adapter available in the PC, POS, etc.</a:t>
+            </a:r>
+          </a:p>
+          <a:p>
+            <a:pPr>
+              <a:spcAft>
+                <a:spcPts val="600"/>
+              </a:spcAft>
+            </a:pPr>
+            <a:r>
+              <a:rPr lang="en-US" sz="1200" dirty="0" smtClean="0">
+                <a:latin typeface="Arial" panose="020B0604020202020204" pitchFamily="34" charset="0"/>
+                <a:cs typeface="Arial" panose="020B0604020202020204" pitchFamily="34" charset="0"/>
+              </a:rPr>
+              <a:t>The information in the NDEF records minimally include:</a:t>
+            </a:r>
+          </a:p>
+          <a:p>
+            <a:pPr marL="171450" indent="-171450">
+              <a:spcAft>
+                <a:spcPts val="600"/>
+              </a:spcAft>
+              <a:buFont typeface="Arial" panose="020B0604020202020204" pitchFamily="34" charset="0"/>
+              <a:buChar char="•"/>
+            </a:pPr>
+            <a:r>
+              <a:rPr lang="en-US" sz="1200" dirty="0" smtClean="0">
+                <a:latin typeface="Arial" panose="020B0604020202020204" pitchFamily="34" charset="0"/>
+                <a:cs typeface="Arial" panose="020B0604020202020204" pitchFamily="34" charset="0"/>
+              </a:rPr>
+              <a:t>The name of the application to invoke in the connecting mobile device</a:t>
+            </a:r>
+          </a:p>
+          <a:p>
+            <a:pPr marL="171450" indent="-171450">
+              <a:spcAft>
+                <a:spcPts val="600"/>
+              </a:spcAft>
+              <a:buFont typeface="Arial" panose="020B0604020202020204" pitchFamily="34" charset="0"/>
+              <a:buChar char="•"/>
+            </a:pPr>
+            <a:r>
+              <a:rPr lang="en-US" sz="1200" dirty="0" smtClean="0">
+                <a:latin typeface="Arial" panose="020B0604020202020204" pitchFamily="34" charset="0"/>
+                <a:cs typeface="Arial" panose="020B0604020202020204" pitchFamily="34" charset="0"/>
+              </a:rPr>
+              <a:t>BLE pairing data including a random number used as password</a:t>
+            </a:r>
+          </a:p>
+          <a:p>
+            <a:pPr marL="171450" indent="-171450">
+              <a:spcAft>
+                <a:spcPts val="600"/>
+              </a:spcAft>
+              <a:buFont typeface="Arial" panose="020B0604020202020204" pitchFamily="34" charset="0"/>
+              <a:buChar char="•"/>
+            </a:pPr>
+            <a:r>
+              <a:rPr lang="en-US" sz="1200" dirty="0" smtClean="0">
+                <a:latin typeface="Arial" panose="020B0604020202020204" pitchFamily="34" charset="0"/>
+                <a:cs typeface="Arial" panose="020B0604020202020204" pitchFamily="34" charset="0"/>
+              </a:rPr>
+              <a:t>Domain data of the requesting Web-page (URL + Server certificate path)</a:t>
+            </a:r>
+            <a:endParaRPr lang="en-US" sz="1200" dirty="0">
+              <a:latin typeface="Arial" panose="020B0604020202020204" pitchFamily="34" charset="0"/>
+              <a:cs typeface="Arial" panose="020B0604020202020204" pitchFamily="34" charset="0"/>
+            </a:endParaRPr>
+          </a:p>
+          <a:p>
+            <a:pPr>
+              <a:spcBef>
+                <a:spcPts val="600"/>
+              </a:spcBef>
+              <a:spcAft>
+                <a:spcPts val="600"/>
+              </a:spcAft>
+            </a:pPr>
+            <a:r>
+              <a:rPr lang="en-US" sz="1200" dirty="0" smtClean="0">
+                <a:latin typeface="Arial" panose="020B0604020202020204" pitchFamily="34" charset="0"/>
+                <a:cs typeface="Arial" panose="020B0604020202020204" pitchFamily="34" charset="0"/>
+              </a:rPr>
+              <a:t>The JavaScript extension is implemented in a Web-side agent which also deals with the BLE setup and communication.</a:t>
+            </a:r>
+          </a:p>
+          <a:p>
+            <a:pPr>
+              <a:spcAft>
+                <a:spcPts val="600"/>
+              </a:spcAft>
+            </a:pPr>
+            <a:r>
+              <a:rPr lang="en-US" sz="1200" dirty="0" smtClean="0">
+                <a:latin typeface="Arial" panose="020B0604020202020204" pitchFamily="34" charset="0"/>
+                <a:cs typeface="Arial" panose="020B0604020202020204" pitchFamily="34" charset="0"/>
+              </a:rPr>
+              <a:t>After successful BLE setup, the Web-side agent forwards incoming BLE data to the originating Web-page as well as sending data going out from the Web-page back to the device.</a:t>
+            </a:r>
+          </a:p>
+          <a:p>
+            <a:pPr>
+              <a:spcAft>
+                <a:spcPts val="600"/>
+              </a:spcAft>
+            </a:pPr>
+            <a:r>
+              <a:rPr lang="en-US" sz="1200" dirty="0" smtClean="0">
+                <a:latin typeface="Arial" panose="020B0604020202020204" pitchFamily="34" charset="0"/>
+                <a:cs typeface="Arial" panose="020B0604020202020204" pitchFamily="34" charset="0"/>
+              </a:rPr>
+              <a:t>In a calling Web-page the </a:t>
+            </a:r>
+            <a:r>
+              <a:rPr lang="en-US" sz="1200" dirty="0">
+                <a:latin typeface="Arial" panose="020B0604020202020204" pitchFamily="34" charset="0"/>
+                <a:cs typeface="Arial" panose="020B0604020202020204" pitchFamily="34" charset="0"/>
+              </a:rPr>
+              <a:t>channel is expressed through </a:t>
+            </a:r>
+            <a:r>
+              <a:rPr lang="en-US" sz="1200" b="1" dirty="0" err="1">
+                <a:latin typeface="Courier New" panose="02070309020205020404" pitchFamily="49" charset="0"/>
+                <a:cs typeface="Courier New" panose="02070309020205020404" pitchFamily="49" charset="0"/>
+              </a:rPr>
+              <a:t>addEventListener</a:t>
+            </a:r>
+            <a:r>
+              <a:rPr lang="en-US" sz="1200" dirty="0">
+                <a:latin typeface="Arial" panose="020B0604020202020204" pitchFamily="34" charset="0"/>
+                <a:cs typeface="Arial" panose="020B0604020202020204" pitchFamily="34" charset="0"/>
+              </a:rPr>
+              <a:t> and </a:t>
+            </a:r>
+            <a:r>
+              <a:rPr lang="en-US" sz="1200" b="1" dirty="0" err="1">
+                <a:latin typeface="Courier New" panose="02070309020205020404" pitchFamily="49" charset="0"/>
+                <a:cs typeface="Courier New" panose="02070309020205020404" pitchFamily="49" charset="0"/>
+              </a:rPr>
+              <a:t>postMessage</a:t>
+            </a:r>
+            <a:r>
+              <a:rPr lang="en-US" sz="1200" dirty="0">
+                <a:latin typeface="Arial" panose="020B0604020202020204" pitchFamily="34" charset="0"/>
+                <a:cs typeface="Arial" panose="020B0604020202020204" pitchFamily="34" charset="0"/>
+              </a:rPr>
+              <a:t> methods used in many other places in a Web-browser.</a:t>
+            </a:r>
+          </a:p>
+          <a:p>
+            <a:pPr>
+              <a:spcAft>
+                <a:spcPts val="600"/>
+              </a:spcAft>
+            </a:pPr>
+            <a:r>
+              <a:rPr lang="en-US" sz="1200" dirty="0" smtClean="0">
+                <a:latin typeface="Arial" panose="020B0604020202020204" pitchFamily="34" charset="0"/>
+                <a:cs typeface="Arial" panose="020B0604020202020204" pitchFamily="34" charset="0"/>
+              </a:rPr>
+              <a:t>The created channel is opaque (with respect to the Web-side agent), because the interface is deliberately application-neutral.  The exact meaning of the data is thus a convention between the invoked application in the connecting device and the </a:t>
+            </a:r>
+            <a:r>
+              <a:rPr lang="en-US" sz="1200" dirty="0">
+                <a:latin typeface="Arial" panose="020B0604020202020204" pitchFamily="34" charset="0"/>
+                <a:cs typeface="Arial" panose="020B0604020202020204" pitchFamily="34" charset="0"/>
+              </a:rPr>
+              <a:t>requesting Web-page</a:t>
+            </a:r>
+            <a:r>
+              <a:rPr lang="en-US" sz="1200" dirty="0" smtClean="0">
+                <a:latin typeface="Arial" panose="020B0604020202020204" pitchFamily="34" charset="0"/>
+                <a:cs typeface="Arial" panose="020B0604020202020204" pitchFamily="34" charset="0"/>
+              </a:rPr>
+              <a:t>. </a:t>
+            </a:r>
+            <a:endParaRPr lang="en-US" sz="1200" dirty="0">
+              <a:latin typeface="Arial" panose="020B0604020202020204" pitchFamily="34" charset="0"/>
+              <a:cs typeface="Arial" panose="020B0604020202020204" pitchFamily="34" charset="0"/>
+            </a:endParaRPr>
+          </a:p>
+        </p:txBody>
+      </p:sp>
+    </p:spTree>
+    <p:extLst>
+      <p:ext uri="{BB962C8B-B14F-4D97-AF65-F5344CB8AC3E}">
+        <p14:creationId xmlns:p14="http://schemas.microsoft.com/office/powerpoint/2010/main" val="3935145538"/>
+      </p:ext>
+    </p:extLst>
+  </p:cSld>
+  <p:clrMapOvr>
+    <a:masterClrMapping/>
+  </p:clrMapOvr>
+  <p:timing>
+    <p:tnLst>
+      <p:par>
+        <p:cTn id="1" dur="indefinite" restart="never" nodeType="tmRoot"/>
+      </p:par>
+    </p:tnLst>
+  </p:timing>
+</p:sld>
+</file>
+
+<file path=ppt/slides/slide4.xml><?xml version="1.0" encoding="utf-8"?>
+<p:sld xmlns:a="http://schemas.openxmlformats.org/drawingml/2006/main" xmlns:r="http://schemas.openxmlformats.org/officeDocument/2006/relationships" xmlns:p="http://schemas.openxmlformats.org/presentationml/2006/main">
+  <p:cSld>
+    <p:spTree>
+      <p:nvGrpSpPr>
+        <p:cNvPr id="1" name=""/>
+        <p:cNvGrpSpPr/>
+        <p:nvPr/>
+      </p:nvGrpSpPr>
+      <p:grpSpPr>
+        <a:xfrm>
+          <a:off x="0" y="0"/>
+          <a:ext cx="0" cy="0"/>
+          <a:chOff x="0" y="0"/>
+          <a:chExt cx="0" cy="0"/>
+        </a:xfrm>
+      </p:grpSpPr>
+      <p:sp>
+        <p:nvSpPr>
+          <p:cNvPr id="39" name="TextBox 38"/>
+          <p:cNvSpPr txBox="1"/>
+          <p:nvPr/>
+        </p:nvSpPr>
+        <p:spPr>
+          <a:xfrm>
+            <a:off x="2039982" y="292586"/>
+            <a:ext cx="4867103" cy="461665"/>
+          </a:xfrm>
+          <a:prstGeom prst="rect">
+            <a:avLst/>
+          </a:prstGeom>
+          <a:noFill/>
+        </p:spPr>
+        <p:txBody>
+          <a:bodyPr wrap="none" rtlCol="0">
+            <a:spAutoFit/>
+          </a:bodyPr>
+          <a:lstStyle/>
+          <a:p>
+            <a:pPr algn="ctr"/>
+            <a:r>
+              <a:rPr lang="en-US" sz="2400" dirty="0" err="1" smtClean="0">
+                <a:latin typeface="Times New Roman" panose="02020603050405020304" pitchFamily="18" charset="0"/>
+                <a:cs typeface="Times New Roman" panose="02020603050405020304" pitchFamily="18" charset="0"/>
+              </a:rPr>
+              <a:t>WebNFC</a:t>
+            </a:r>
+            <a:r>
+              <a:rPr lang="en-US" sz="2400" dirty="0" smtClean="0">
+                <a:latin typeface="Times New Roman" panose="02020603050405020304" pitchFamily="18" charset="0"/>
+                <a:cs typeface="Times New Roman" panose="02020603050405020304" pitchFamily="18" charset="0"/>
+              </a:rPr>
+              <a:t> Bridge – Device Side Agent</a:t>
+            </a:r>
+            <a:endParaRPr lang="en-US" sz="2400" dirty="0">
+              <a:latin typeface="Arial" panose="020B0604020202020204" pitchFamily="34" charset="0"/>
+              <a:cs typeface="Arial" panose="020B0604020202020204" pitchFamily="34" charset="0"/>
+            </a:endParaRPr>
+          </a:p>
+        </p:txBody>
+      </p:sp>
+      <p:sp>
+        <p:nvSpPr>
+          <p:cNvPr id="2" name="TextBox 1"/>
+          <p:cNvSpPr txBox="1"/>
+          <p:nvPr/>
+        </p:nvSpPr>
+        <p:spPr>
+          <a:xfrm>
+            <a:off x="539552" y="1340768"/>
+            <a:ext cx="7992888" cy="2662267"/>
+          </a:xfrm>
+          <a:prstGeom prst="rect">
+            <a:avLst/>
+          </a:prstGeom>
+          <a:noFill/>
+        </p:spPr>
+        <p:txBody>
+          <a:bodyPr wrap="square" rtlCol="0">
+            <a:spAutoFit/>
+          </a:bodyPr>
+          <a:lstStyle/>
+          <a:p>
+            <a:pPr>
+              <a:spcAft>
+                <a:spcPts val="600"/>
+              </a:spcAft>
+            </a:pPr>
+            <a:r>
+              <a:rPr lang="en-US" sz="1200" dirty="0" smtClean="0">
+                <a:latin typeface="Arial" panose="020B0604020202020204" pitchFamily="34" charset="0"/>
+                <a:cs typeface="Arial" panose="020B0604020202020204" pitchFamily="34" charset="0"/>
+              </a:rPr>
+              <a:t>The Device-side agent listens to incoming NFC NDEF records.  This agent is a security-critical system since it eventually invokes a native (local) application without necessary asking the user first.  This works because applications are supposed to be vetted for invocation from an untrusted Web.</a:t>
+            </a:r>
+          </a:p>
+          <a:p>
+            <a:pPr>
+              <a:spcAft>
+                <a:spcPts val="600"/>
+              </a:spcAft>
+            </a:pPr>
+            <a:r>
+              <a:rPr lang="en-US" sz="1200" dirty="0" smtClean="0">
+                <a:latin typeface="Arial" panose="020B0604020202020204" pitchFamily="34" charset="0"/>
+                <a:cs typeface="Arial" panose="020B0604020202020204" pitchFamily="34" charset="0"/>
+              </a:rPr>
+              <a:t>Before the application named in the NDEF record is invoked, the Device-side agent setups the channel using BLE. </a:t>
+            </a:r>
+          </a:p>
+          <a:p>
+            <a:pPr>
+              <a:spcAft>
+                <a:spcPts val="600"/>
+              </a:spcAft>
+            </a:pPr>
+            <a:r>
+              <a:rPr lang="en-US" sz="1200" dirty="0" smtClean="0">
+                <a:latin typeface="Arial" panose="020B0604020202020204" pitchFamily="34" charset="0"/>
+                <a:cs typeface="Arial" panose="020B0604020202020204" pitchFamily="34" charset="0"/>
+              </a:rPr>
+              <a:t>The invocation of the target application minimally includes the following data:</a:t>
+            </a:r>
+          </a:p>
+          <a:p>
+            <a:pPr marL="171450" indent="-171450">
+              <a:spcAft>
+                <a:spcPts val="600"/>
+              </a:spcAft>
+              <a:buFont typeface="Arial" panose="020B0604020202020204" pitchFamily="34" charset="0"/>
+              <a:buChar char="•"/>
+            </a:pPr>
+            <a:r>
+              <a:rPr lang="en-US" sz="1200" dirty="0" smtClean="0">
+                <a:latin typeface="Arial" panose="020B0604020202020204" pitchFamily="34" charset="0"/>
+                <a:cs typeface="Arial" panose="020B0604020202020204" pitchFamily="34" charset="0"/>
+              </a:rPr>
+              <a:t>NFC device information used for logging purposes</a:t>
+            </a:r>
+          </a:p>
+          <a:p>
+            <a:pPr marL="171450" indent="-171450">
+              <a:spcAft>
+                <a:spcPts val="600"/>
+              </a:spcAft>
+              <a:buFont typeface="Arial" panose="020B0604020202020204" pitchFamily="34" charset="0"/>
+              <a:buChar char="•"/>
+            </a:pPr>
+            <a:r>
+              <a:rPr lang="en-US" sz="1200" dirty="0" smtClean="0">
+                <a:latin typeface="Arial" panose="020B0604020202020204" pitchFamily="34" charset="0"/>
+                <a:cs typeface="Arial" panose="020B0604020202020204" pitchFamily="34" charset="0"/>
+              </a:rPr>
+              <a:t>Handle to the communication channel interface which in most operating system would be based on </a:t>
+            </a:r>
+            <a:r>
+              <a:rPr lang="en-US" sz="1200" b="1" dirty="0" err="1">
+                <a:latin typeface="Courier New" panose="02070309020205020404" pitchFamily="49" charset="0"/>
+                <a:cs typeface="Courier New" panose="02070309020205020404" pitchFamily="49" charset="0"/>
+              </a:rPr>
+              <a:t>stdin</a:t>
+            </a:r>
+            <a:r>
+              <a:rPr lang="en-US" sz="1200" dirty="0" smtClean="0">
+                <a:latin typeface="Arial" panose="020B0604020202020204" pitchFamily="34" charset="0"/>
+                <a:cs typeface="Arial" panose="020B0604020202020204" pitchFamily="34" charset="0"/>
+              </a:rPr>
+              <a:t> and </a:t>
+            </a:r>
+            <a:r>
+              <a:rPr lang="en-US" sz="1200" b="1" dirty="0" err="1">
+                <a:latin typeface="Courier New" panose="02070309020205020404" pitchFamily="49" charset="0"/>
+                <a:cs typeface="Courier New" panose="02070309020205020404" pitchFamily="49" charset="0"/>
+              </a:rPr>
+              <a:t>stdout</a:t>
+            </a:r>
+            <a:endParaRPr lang="en-US" sz="1200" b="1" dirty="0">
+              <a:latin typeface="Courier New" panose="02070309020205020404" pitchFamily="49" charset="0"/>
+              <a:cs typeface="Courier New" panose="02070309020205020404" pitchFamily="49" charset="0"/>
+            </a:endParaRPr>
+          </a:p>
+          <a:p>
+            <a:pPr marL="171450" indent="-171450">
+              <a:spcAft>
+                <a:spcPts val="600"/>
+              </a:spcAft>
+              <a:buFont typeface="Arial" panose="020B0604020202020204" pitchFamily="34" charset="0"/>
+              <a:buChar char="•"/>
+            </a:pPr>
+            <a:r>
+              <a:rPr lang="en-US" sz="1200" dirty="0" smtClean="0">
+                <a:latin typeface="Arial" panose="020B0604020202020204" pitchFamily="34" charset="0"/>
+                <a:cs typeface="Arial" panose="020B0604020202020204" pitchFamily="34" charset="0"/>
+              </a:rPr>
+              <a:t>Domain data of the requesting Web-page (URL + Server certificate path)</a:t>
+            </a:r>
+            <a:endParaRPr lang="en-US" sz="1200" dirty="0">
+              <a:latin typeface="Arial" panose="020B0604020202020204" pitchFamily="34" charset="0"/>
+              <a:cs typeface="Arial" panose="020B0604020202020204" pitchFamily="34" charset="0"/>
+            </a:endParaRPr>
+          </a:p>
+          <a:p>
+            <a:pPr>
+              <a:spcBef>
+                <a:spcPts val="600"/>
+              </a:spcBef>
+              <a:spcAft>
+                <a:spcPts val="600"/>
+              </a:spcAft>
+            </a:pPr>
+            <a:r>
+              <a:rPr lang="en-US" sz="1200" dirty="0">
+                <a:latin typeface="Arial" panose="020B0604020202020204" pitchFamily="34" charset="0"/>
+                <a:cs typeface="Arial" panose="020B0604020202020204" pitchFamily="34" charset="0"/>
+              </a:rPr>
+              <a:t>E</a:t>
+            </a:r>
+            <a:r>
+              <a:rPr lang="en-US" sz="1200" dirty="0" smtClean="0">
+                <a:latin typeface="Arial" panose="020B0604020202020204" pitchFamily="34" charset="0"/>
+                <a:cs typeface="Arial" panose="020B0604020202020204" pitchFamily="34" charset="0"/>
+              </a:rPr>
+              <a:t>ven after invocation the Device-side agent plays a vital role since it converts the data to and from the target application channel into BLE messaging as well as dealing with </a:t>
+            </a:r>
+            <a:r>
+              <a:rPr lang="en-US" sz="1200" smtClean="0">
+                <a:latin typeface="Arial" panose="020B0604020202020204" pitchFamily="34" charset="0"/>
+                <a:cs typeface="Arial" panose="020B0604020202020204" pitchFamily="34" charset="0"/>
+              </a:rPr>
+              <a:t>errors and shutdowns</a:t>
+            </a:r>
+            <a:r>
+              <a:rPr lang="en-US" sz="1200" dirty="0" smtClean="0">
+                <a:latin typeface="Arial" panose="020B0604020202020204" pitchFamily="34" charset="0"/>
+                <a:cs typeface="Arial" panose="020B0604020202020204" pitchFamily="34" charset="0"/>
+              </a:rPr>
+              <a:t>.</a:t>
+            </a:r>
+            <a:endParaRPr lang="en-US" sz="1200" dirty="0">
+              <a:latin typeface="Arial" panose="020B0604020202020204" pitchFamily="34" charset="0"/>
+              <a:cs typeface="Arial" panose="020B0604020202020204" pitchFamily="34" charset="0"/>
+            </a:endParaRPr>
+          </a:p>
+        </p:txBody>
+      </p:sp>
+    </p:spTree>
+    <p:extLst>
+      <p:ext uri="{BB962C8B-B14F-4D97-AF65-F5344CB8AC3E}">
+        <p14:creationId xmlns:p14="http://schemas.microsoft.com/office/powerpoint/2010/main" val="4178824350"/>
+      </p:ext>
+    </p:extLst>
+  </p:cSld>
+  <p:clrMapOvr>
+    <a:masterClrMapping/>
+  </p:clrMapOvr>
+  <p:timing>
+    <p:tnLst>
+      <p:par>
+        <p:cTn id="1" dur="indefinite" restart="never" nodeType="tmRoot"/>
+      </p:par>
+    </p:tnLst>
+  </p:timing>
+</p:sld>
+</file>
+
+<file path=ppt/slides/slide5.xml><?xml version="1.0" encoding="utf-8"?>
+<p:sld xmlns:a="http://schemas.openxmlformats.org/drawingml/2006/main" xmlns:r="http://schemas.openxmlformats.org/officeDocument/2006/relationships" xmlns:p="http://schemas.openxmlformats.org/presentationml/2006/main">
+  <p:cSld>
+    <p:spTree>
+      <p:nvGrpSpPr>
+        <p:cNvPr id="1" name=""/>
+        <p:cNvGrpSpPr/>
+        <p:nvPr/>
+      </p:nvGrpSpPr>
+      <p:grpSpPr>
+        <a:xfrm>
+          <a:off x="0" y="0"/>
+          <a:ext cx="0" cy="0"/>
+          <a:chOff x="0" y="0"/>
+          <a:chExt cx="0" cy="0"/>
+        </a:xfrm>
+      </p:grpSpPr>
+      <p:sp>
+        <p:nvSpPr>
           <p:cNvPr id="11" name="TextBox 10"/>
           <p:cNvSpPr txBox="1"/>
           <p:nvPr/>
@@ -7437,13 +8394,15 @@
       <p:cxnSp>
         <p:nvCxnSpPr>
           <p:cNvPr id="16" name="Straight Arrow Connector 15"/>
-          <p:cNvCxnSpPr/>
+          <p:cNvCxnSpPr>
+            <a:stCxn id="17" idx="2"/>
+          </p:cNvCxnSpPr>
           <p:nvPr/>
         </p:nvCxnSpPr>
         <p:spPr>
           <a:xfrm>
-            <a:off x="1691680" y="1772816"/>
-            <a:ext cx="36004" cy="4464496"/>
+            <a:off x="1691680" y="1835181"/>
+            <a:ext cx="36004" cy="4402131"/>
           </a:xfrm>
           <a:prstGeom prst="straightConnector1">
             <a:avLst/>
@@ -7475,8 +8434,8 @@
         </p:nvSpPr>
         <p:spPr>
           <a:xfrm>
-            <a:off x="1115616" y="1412776"/>
-            <a:ext cx="1152128" cy="330072"/>
+            <a:off x="1115616" y="1320443"/>
+            <a:ext cx="1152128" cy="514738"/>
           </a:xfrm>
           <a:prstGeom prst="rect">
             <a:avLst/>
@@ -7499,7 +8458,7 @@
                 <a:latin typeface="Arial" panose="020B0604020202020204" pitchFamily="34" charset="0"/>
                 <a:cs typeface="Arial" panose="020B0604020202020204" pitchFamily="34" charset="0"/>
               </a:rPr>
-              <a:t>Agent</a:t>
+              <a:t>Web Side Agent</a:t>
             </a:r>
             <a:endParaRPr lang="en-US" sz="1200" dirty="0">
               <a:latin typeface="Arial" panose="020B0604020202020204" pitchFamily="34" charset="0"/>
@@ -7812,8 +8771,8 @@
         </p:nvCxnSpPr>
         <p:spPr>
           <a:xfrm>
-            <a:off x="6660232" y="1772816"/>
-            <a:ext cx="36004" cy="4464496"/>
+            <a:off x="6660232" y="1835181"/>
+            <a:ext cx="36004" cy="4402131"/>
           </a:xfrm>
           <a:prstGeom prst="straightConnector1">
             <a:avLst/>
@@ -7845,8 +8804,8 @@
         </p:nvSpPr>
         <p:spPr>
           <a:xfrm>
-            <a:off x="6084168" y="1412776"/>
-            <a:ext cx="1152128" cy="330072"/>
+            <a:off x="6084168" y="1320443"/>
+            <a:ext cx="1152128" cy="514738"/>
           </a:xfrm>
           <a:prstGeom prst="rect">
             <a:avLst/>
@@ -7864,6 +8823,19 @@
           <a:lstStyle/>
           <a:p>
             <a:pPr algn="ctr"/>
+            <a:r>
+              <a:rPr lang="en-US" sz="1200" dirty="0" smtClean="0">
+                <a:latin typeface="Arial" panose="020B0604020202020204" pitchFamily="34" charset="0"/>
+                <a:cs typeface="Arial" panose="020B0604020202020204" pitchFamily="34" charset="0"/>
+              </a:rPr>
+              <a:t>Device Side</a:t>
+            </a:r>
+            <a:br>
+              <a:rPr lang="en-US" sz="1200" dirty="0" smtClean="0">
+                <a:latin typeface="Arial" panose="020B0604020202020204" pitchFamily="34" charset="0"/>
+                <a:cs typeface="Arial" panose="020B0604020202020204" pitchFamily="34" charset="0"/>
+              </a:rPr>
+            </a:br>
             <a:r>
               <a:rPr lang="en-US" sz="1200" dirty="0" smtClean="0">
                 <a:latin typeface="Arial" panose="020B0604020202020204" pitchFamily="34" charset="0"/>
@@ -8696,10 +9668,210 @@
           </a:p>
         </p:txBody>
       </p:sp>
+      <p:sp>
+        <p:nvSpPr>
+          <p:cNvPr id="3" name="Oval 2"/>
+          <p:cNvSpPr/>
+          <p:nvPr/>
+        </p:nvSpPr>
+        <p:spPr>
+          <a:xfrm>
+            <a:off x="1698695" y="5565189"/>
+            <a:ext cx="45719" cy="45719"/>
+          </a:xfrm>
+          <a:prstGeom prst="ellipse">
+            <a:avLst/>
+          </a:prstGeom>
+          <a:noFill/>
+          <a:ln w="6350">
+            <a:solidFill>
+              <a:schemeClr val="tx1"/>
+            </a:solidFill>
+          </a:ln>
+          <a:effectLst/>
+        </p:spPr>
+        <p:style>
+          <a:lnRef idx="2">
+            <a:schemeClr val="accent1">
+              <a:shade val="50000"/>
+            </a:schemeClr>
+          </a:lnRef>
+          <a:fillRef idx="1">
+            <a:schemeClr val="accent1"/>
+          </a:fillRef>
+          <a:effectRef idx="0">
+            <a:schemeClr val="accent1"/>
+          </a:effectRef>
+          <a:fontRef idx="minor">
+            <a:schemeClr val="lt1"/>
+          </a:fontRef>
+        </p:style>
+        <p:txBody>
+          <a:bodyPr rtlCol="0" anchor="ctr"/>
+          <a:lstStyle/>
+          <a:p>
+            <a:pPr algn="ctr"/>
+            <a:endParaRPr lang="en-US" dirty="0" smtClean="0">
+              <a:latin typeface="Arial" panose="020B0604020202020204" pitchFamily="34" charset="0"/>
+              <a:cs typeface="Arial" panose="020B0604020202020204" pitchFamily="34" charset="0"/>
+            </a:endParaRPr>
+          </a:p>
+        </p:txBody>
+      </p:sp>
+      <p:sp>
+        <p:nvSpPr>
+          <p:cNvPr id="41" name="Oval 40"/>
+          <p:cNvSpPr/>
+          <p:nvPr/>
+        </p:nvSpPr>
+        <p:spPr>
+          <a:xfrm>
+            <a:off x="3571121" y="5566150"/>
+            <a:ext cx="45719" cy="45719"/>
+          </a:xfrm>
+          <a:prstGeom prst="ellipse">
+            <a:avLst/>
+          </a:prstGeom>
+          <a:noFill/>
+          <a:ln w="6350">
+            <a:solidFill>
+              <a:schemeClr val="tx1"/>
+            </a:solidFill>
+          </a:ln>
+          <a:effectLst/>
+        </p:spPr>
+        <p:style>
+          <a:lnRef idx="2">
+            <a:schemeClr val="accent1">
+              <a:shade val="50000"/>
+            </a:schemeClr>
+          </a:lnRef>
+          <a:fillRef idx="1">
+            <a:schemeClr val="accent1"/>
+          </a:fillRef>
+          <a:effectRef idx="0">
+            <a:schemeClr val="accent1"/>
+          </a:effectRef>
+          <a:fontRef idx="minor">
+            <a:schemeClr val="lt1"/>
+          </a:fontRef>
+        </p:style>
+        <p:txBody>
+          <a:bodyPr rtlCol="0" anchor="ctr"/>
+          <a:lstStyle/>
+          <a:p>
+            <a:pPr algn="ctr"/>
+            <a:endParaRPr lang="en-US" dirty="0" smtClean="0">
+              <a:latin typeface="Arial" panose="020B0604020202020204" pitchFamily="34" charset="0"/>
+              <a:cs typeface="Arial" panose="020B0604020202020204" pitchFamily="34" charset="0"/>
+            </a:endParaRPr>
+          </a:p>
+        </p:txBody>
+      </p:sp>
+      <p:sp>
+        <p:nvSpPr>
+          <p:cNvPr id="45" name="Oval 44"/>
+          <p:cNvSpPr/>
+          <p:nvPr/>
+        </p:nvSpPr>
+        <p:spPr>
+          <a:xfrm>
+            <a:off x="4794332" y="5567111"/>
+            <a:ext cx="45719" cy="45719"/>
+          </a:xfrm>
+          <a:prstGeom prst="ellipse">
+            <a:avLst/>
+          </a:prstGeom>
+          <a:noFill/>
+          <a:ln w="6350">
+            <a:solidFill>
+              <a:schemeClr val="tx1"/>
+            </a:solidFill>
+          </a:ln>
+          <a:effectLst/>
+        </p:spPr>
+        <p:style>
+          <a:lnRef idx="2">
+            <a:schemeClr val="accent1">
+              <a:shade val="50000"/>
+            </a:schemeClr>
+          </a:lnRef>
+          <a:fillRef idx="1">
+            <a:schemeClr val="accent1"/>
+          </a:fillRef>
+          <a:effectRef idx="0">
+            <a:schemeClr val="accent1"/>
+          </a:effectRef>
+          <a:fontRef idx="minor">
+            <a:schemeClr val="lt1"/>
+          </a:fontRef>
+        </p:style>
+        <p:txBody>
+          <a:bodyPr rtlCol="0" anchor="ctr"/>
+          <a:lstStyle/>
+          <a:p>
+            <a:pPr algn="ctr"/>
+            <a:endParaRPr lang="en-US" dirty="0" smtClean="0">
+              <a:latin typeface="Arial" panose="020B0604020202020204" pitchFamily="34" charset="0"/>
+              <a:cs typeface="Arial" panose="020B0604020202020204" pitchFamily="34" charset="0"/>
+            </a:endParaRPr>
+          </a:p>
+        </p:txBody>
+      </p:sp>
+      <p:sp>
+        <p:nvSpPr>
+          <p:cNvPr id="46" name="Oval 45"/>
+          <p:cNvSpPr/>
+          <p:nvPr/>
+        </p:nvSpPr>
+        <p:spPr>
+          <a:xfrm>
+            <a:off x="6669760" y="5565690"/>
+            <a:ext cx="45719" cy="45719"/>
+          </a:xfrm>
+          <a:prstGeom prst="ellipse">
+            <a:avLst/>
+          </a:prstGeom>
+          <a:noFill/>
+          <a:ln w="6350">
+            <a:solidFill>
+              <a:schemeClr val="tx1"/>
+            </a:solidFill>
+          </a:ln>
+          <a:effectLst/>
+        </p:spPr>
+        <p:style>
+          <a:lnRef idx="2">
+            <a:schemeClr val="accent1">
+              <a:shade val="50000"/>
+            </a:schemeClr>
+          </a:lnRef>
+          <a:fillRef idx="1">
+            <a:schemeClr val="accent1"/>
+          </a:fillRef>
+          <a:effectRef idx="0">
+            <a:schemeClr val="accent1"/>
+          </a:effectRef>
+          <a:fontRef idx="minor">
+            <a:schemeClr val="lt1"/>
+          </a:fontRef>
+        </p:style>
+        <p:txBody>
+          <a:bodyPr rtlCol="0" anchor="ctr"/>
+          <a:lstStyle/>
+          <a:p>
+            <a:pPr algn="ctr"/>
+            <a:endParaRPr lang="en-US" dirty="0" smtClean="0">
+              <a:latin typeface="Arial" panose="020B0604020202020204" pitchFamily="34" charset="0"/>
+              <a:cs typeface="Arial" panose="020B0604020202020204" pitchFamily="34" charset="0"/>
+            </a:endParaRPr>
+          </a:p>
+        </p:txBody>
+      </p:sp>
     </p:spTree>
     <p:extLst>
       <p:ext uri="{BB962C8B-B14F-4D97-AF65-F5344CB8AC3E}">
-        <p14:creationId xmlns:p14="http://schemas.microsoft.com/office/powerpoint/2010/main" val="3515459657"/>
+        <p14:creationId xmlns:p14="http://schemas.microsoft.com/office/powerpoint/2010/main" val="3100750157"/>
       </p:ext>
     </p:extLst>
   </p:cSld>
@@ -8716,7 +9888,7 @@
 </p:sld>
 </file>
 
-<file path=ppt/slides/slide4.xml><?xml version="1.0" encoding="utf-8"?>
+<file path=ppt/slides/slide6.xml><?xml version="1.0" encoding="utf-8"?>
 <p:sld xmlns:a="http://schemas.openxmlformats.org/drawingml/2006/main" xmlns:r="http://schemas.openxmlformats.org/officeDocument/2006/relationships" xmlns:p="http://schemas.openxmlformats.org/presentationml/2006/main">
   <p:cSld>
     <p:spTree>

</xml_diff>